<commit_message>
update pinhole camera model
</commit_message>
<xml_diff>
--- a/assets/posts/vslam/14-ch5/camera.pptx
+++ b/assets/posts/vslam/14-ch5/camera.pptx
@@ -270,7 +270,7 @@
           <a:p>
             <a:fld id="{FCD14527-64F6-420C-945F-B6CF35810A6B}" type="datetimeFigureOut">
               <a:rPr lang="zh-CN" altLang="en-US" smtClean="0"/>
-              <a:t>2022/5/22</a:t>
+              <a:t>2022/5/23</a:t>
             </a:fld>
             <a:endParaRPr lang="zh-CN" altLang="en-US"/>
           </a:p>
@@ -468,7 +468,7 @@
           <a:p>
             <a:fld id="{FCD14527-64F6-420C-945F-B6CF35810A6B}" type="datetimeFigureOut">
               <a:rPr lang="zh-CN" altLang="en-US" smtClean="0"/>
-              <a:t>2022/5/22</a:t>
+              <a:t>2022/5/23</a:t>
             </a:fld>
             <a:endParaRPr lang="zh-CN" altLang="en-US"/>
           </a:p>
@@ -676,7 +676,7 @@
           <a:p>
             <a:fld id="{FCD14527-64F6-420C-945F-B6CF35810A6B}" type="datetimeFigureOut">
               <a:rPr lang="zh-CN" altLang="en-US" smtClean="0"/>
-              <a:t>2022/5/22</a:t>
+              <a:t>2022/5/23</a:t>
             </a:fld>
             <a:endParaRPr lang="zh-CN" altLang="en-US"/>
           </a:p>
@@ -874,7 +874,7 @@
           <a:p>
             <a:fld id="{FCD14527-64F6-420C-945F-B6CF35810A6B}" type="datetimeFigureOut">
               <a:rPr lang="zh-CN" altLang="en-US" smtClean="0"/>
-              <a:t>2022/5/22</a:t>
+              <a:t>2022/5/23</a:t>
             </a:fld>
             <a:endParaRPr lang="zh-CN" altLang="en-US"/>
           </a:p>
@@ -1149,7 +1149,7 @@
           <a:p>
             <a:fld id="{FCD14527-64F6-420C-945F-B6CF35810A6B}" type="datetimeFigureOut">
               <a:rPr lang="zh-CN" altLang="en-US" smtClean="0"/>
-              <a:t>2022/5/22</a:t>
+              <a:t>2022/5/23</a:t>
             </a:fld>
             <a:endParaRPr lang="zh-CN" altLang="en-US"/>
           </a:p>
@@ -1414,7 +1414,7 @@
           <a:p>
             <a:fld id="{FCD14527-64F6-420C-945F-B6CF35810A6B}" type="datetimeFigureOut">
               <a:rPr lang="zh-CN" altLang="en-US" smtClean="0"/>
-              <a:t>2022/5/22</a:t>
+              <a:t>2022/5/23</a:t>
             </a:fld>
             <a:endParaRPr lang="zh-CN" altLang="en-US"/>
           </a:p>
@@ -1826,7 +1826,7 @@
           <a:p>
             <a:fld id="{FCD14527-64F6-420C-945F-B6CF35810A6B}" type="datetimeFigureOut">
               <a:rPr lang="zh-CN" altLang="en-US" smtClean="0"/>
-              <a:t>2022/5/22</a:t>
+              <a:t>2022/5/23</a:t>
             </a:fld>
             <a:endParaRPr lang="zh-CN" altLang="en-US"/>
           </a:p>
@@ -1967,7 +1967,7 @@
           <a:p>
             <a:fld id="{FCD14527-64F6-420C-945F-B6CF35810A6B}" type="datetimeFigureOut">
               <a:rPr lang="zh-CN" altLang="en-US" smtClean="0"/>
-              <a:t>2022/5/22</a:t>
+              <a:t>2022/5/23</a:t>
             </a:fld>
             <a:endParaRPr lang="zh-CN" altLang="en-US"/>
           </a:p>
@@ -2080,7 +2080,7 @@
           <a:p>
             <a:fld id="{FCD14527-64F6-420C-945F-B6CF35810A6B}" type="datetimeFigureOut">
               <a:rPr lang="zh-CN" altLang="en-US" smtClean="0"/>
-              <a:t>2022/5/22</a:t>
+              <a:t>2022/5/23</a:t>
             </a:fld>
             <a:endParaRPr lang="zh-CN" altLang="en-US"/>
           </a:p>
@@ -2391,7 +2391,7 @@
           <a:p>
             <a:fld id="{FCD14527-64F6-420C-945F-B6CF35810A6B}" type="datetimeFigureOut">
               <a:rPr lang="zh-CN" altLang="en-US" smtClean="0"/>
-              <a:t>2022/5/22</a:t>
+              <a:t>2022/5/23</a:t>
             </a:fld>
             <a:endParaRPr lang="zh-CN" altLang="en-US"/>
           </a:p>
@@ -2679,7 +2679,7 @@
           <a:p>
             <a:fld id="{FCD14527-64F6-420C-945F-B6CF35810A6B}" type="datetimeFigureOut">
               <a:rPr lang="zh-CN" altLang="en-US" smtClean="0"/>
-              <a:t>2022/5/22</a:t>
+              <a:t>2022/5/23</a:t>
             </a:fld>
             <a:endParaRPr lang="zh-CN" altLang="en-US"/>
           </a:p>
@@ -2920,7 +2920,7 @@
           <a:p>
             <a:fld id="{FCD14527-64F6-420C-945F-B6CF35810A6B}" type="datetimeFigureOut">
               <a:rPr lang="zh-CN" altLang="en-US" smtClean="0"/>
-              <a:t>2022/5/22</a:t>
+              <a:t>2022/5/23</a:t>
             </a:fld>
             <a:endParaRPr lang="zh-CN" altLang="en-US"/>
           </a:p>
@@ -3339,6 +3339,45 @@
       </p:grpSpPr>
       <p:cxnSp>
         <p:nvCxnSpPr>
+          <p:cNvPr id="16" name="直接连接符 14">
+            <a:extLst>
+              <a:ext uri="{FF2B5EF4-FFF2-40B4-BE49-F238E27FC236}">
+                <a16:creationId xmlns:a16="http://schemas.microsoft.com/office/drawing/2014/main" id="{394547BC-A15F-8D23-7151-1D23A588D42B}"/>
+              </a:ext>
+            </a:extLst>
+          </p:cNvPr>
+          <p:cNvCxnSpPr>
+            <a:cxnSpLocks/>
+          </p:cNvCxnSpPr>
+          <p:nvPr/>
+        </p:nvCxnSpPr>
+        <p:spPr>
+          <a:xfrm>
+            <a:off x="3230470" y="2252930"/>
+            <a:ext cx="1520989" cy="1009579"/>
+          </a:xfrm>
+          <a:prstGeom prst="line">
+            <a:avLst/>
+          </a:prstGeom>
+          <a:ln w="12700" cap="rnd"/>
+        </p:spPr>
+        <p:style>
+          <a:lnRef idx="1">
+            <a:schemeClr val="dk1"/>
+          </a:lnRef>
+          <a:fillRef idx="0">
+            <a:schemeClr val="dk1"/>
+          </a:fillRef>
+          <a:effectRef idx="0">
+            <a:schemeClr val="dk1"/>
+          </a:effectRef>
+          <a:fontRef idx="minor">
+            <a:schemeClr val="tx1"/>
+          </a:fontRef>
+        </p:style>
+      </p:cxnSp>
+      <p:cxnSp>
+        <p:nvCxnSpPr>
           <p:cNvPr id="5" name="直接连接符 4">
             <a:extLst>
               <a:ext uri="{FF2B5EF4-FFF2-40B4-BE49-F238E27FC236}">
@@ -3346,17 +3385,20 @@
               </a:ext>
             </a:extLst>
           </p:cNvPr>
-          <p:cNvCxnSpPr/>
+          <p:cNvCxnSpPr>
+            <a:cxnSpLocks/>
+          </p:cNvCxnSpPr>
           <p:nvPr/>
         </p:nvCxnSpPr>
         <p:spPr>
           <a:xfrm flipH="1">
-            <a:off x="5645792" y="3330429"/>
-            <a:ext cx="2147581" cy="2147581"/>
+            <a:off x="5645792" y="2511430"/>
+            <a:ext cx="2966580" cy="2966580"/>
           </a:xfrm>
           <a:prstGeom prst="line">
             <a:avLst/>
           </a:prstGeom>
+          <a:ln w="12700" cap="rnd"/>
         </p:spPr>
         <p:style>
           <a:lnRef idx="1">
@@ -3382,17 +3424,20 @@
               </a:ext>
             </a:extLst>
           </p:cNvPr>
-          <p:cNvCxnSpPr/>
+          <p:cNvCxnSpPr>
+            <a:cxnSpLocks/>
+          </p:cNvCxnSpPr>
           <p:nvPr/>
         </p:nvCxnSpPr>
         <p:spPr>
           <a:xfrm flipH="1">
-            <a:off x="2694265" y="660633"/>
-            <a:ext cx="2147581" cy="2147581"/>
+            <a:off x="2273099" y="660633"/>
+            <a:ext cx="2544684" cy="2544684"/>
           </a:xfrm>
           <a:prstGeom prst="line">
             <a:avLst/>
           </a:prstGeom>
+          <a:ln w="12700" cap="rnd"/>
         </p:spPr>
         <p:style>
           <a:lnRef idx="1">
@@ -3425,8 +3470,8 @@
         </p:nvCxnSpPr>
         <p:spPr>
           <a:xfrm flipV="1">
-            <a:off x="6610525" y="4068661"/>
-            <a:ext cx="453005" cy="425442"/>
+            <a:off x="6610525" y="3929423"/>
+            <a:ext cx="601264" cy="564680"/>
           </a:xfrm>
           <a:prstGeom prst="straightConnector1">
             <a:avLst/>
@@ -3451,8 +3496,8 @@
           </a:fontRef>
         </p:style>
       </p:cxnSp>
-      <mc:AlternateContent xmlns:mc="http://schemas.openxmlformats.org/markup-compatibility/2006">
-        <mc:Choice xmlns:a14="http://schemas.microsoft.com/office/drawing/2010/main" Requires="a14">
+      <mc:AlternateContent xmlns:mc="http://schemas.openxmlformats.org/markup-compatibility/2006" xmlns:a14="http://schemas.microsoft.com/office/drawing/2010/main">
+        <mc:Choice Requires="a14">
           <p:sp>
             <p:nvSpPr>
               <p:cNvPr id="9" name="文本框 8">
@@ -3467,7 +3512,7 @@
             </p:nvSpPr>
             <p:spPr>
               <a:xfrm>
-                <a:off x="6950961" y="4034887"/>
+                <a:off x="7015964" y="4123080"/>
                 <a:ext cx="509498" cy="338554"/>
               </a:xfrm>
               <a:prstGeom prst="rect">
@@ -3481,6 +3526,7 @@
               </a:bodyPr>
               <a:lstStyle/>
               <a:p>
+                <a:pPr/>
                 <a14:m>
                   <m:oMathPara xmlns:m="http://schemas.openxmlformats.org/officeDocument/2006/math">
                     <m:oMathParaPr>
@@ -3522,7 +3568,7 @@
             </p:txBody>
           </p:sp>
         </mc:Choice>
-        <mc:Fallback>
+        <mc:Fallback xmlns="">
           <p:sp>
             <p:nvSpPr>
               <p:cNvPr id="9" name="文本框 8">
@@ -3539,7 +3585,7 @@
             </p:nvSpPr>
             <p:spPr>
               <a:xfrm>
-                <a:off x="6950961" y="4034887"/>
+                <a:off x="7015964" y="4123080"/>
                 <a:ext cx="509498" cy="338554"/>
               </a:xfrm>
               <a:prstGeom prst="rect">
@@ -3584,7 +3630,7 @@
         <p:spPr>
           <a:xfrm>
             <a:off x="6609658" y="4504888"/>
-            <a:ext cx="0" cy="540000"/>
+            <a:ext cx="0" cy="864554"/>
           </a:xfrm>
           <a:prstGeom prst="straightConnector1">
             <a:avLst/>
@@ -3609,8 +3655,52 @@
           </a:fontRef>
         </p:style>
       </p:cxnSp>
-      <mc:AlternateContent xmlns:mc="http://schemas.openxmlformats.org/markup-compatibility/2006">
-        <mc:Choice xmlns:a14="http://schemas.microsoft.com/office/drawing/2010/main" Requires="a14">
+      <p:cxnSp>
+        <p:nvCxnSpPr>
+          <p:cNvPr id="39" name="直线连接符 38">
+            <a:extLst>
+              <a:ext uri="{FF2B5EF4-FFF2-40B4-BE49-F238E27FC236}">
+                <a16:creationId xmlns:a16="http://schemas.microsoft.com/office/drawing/2014/main" id="{0F961098-52A6-6D54-105C-F9962B5E66A6}"/>
+              </a:ext>
+            </a:extLst>
+          </p:cNvPr>
+          <p:cNvCxnSpPr>
+            <a:cxnSpLocks/>
+            <a:endCxn id="33" idx="3"/>
+          </p:cNvCxnSpPr>
+          <p:nvPr/>
+        </p:nvCxnSpPr>
+        <p:spPr>
+          <a:xfrm>
+            <a:off x="4310211" y="697217"/>
+            <a:ext cx="1009060" cy="1672795"/>
+          </a:xfrm>
+          <a:prstGeom prst="line">
+            <a:avLst/>
+          </a:prstGeom>
+          <a:ln w="19050">
+            <a:solidFill>
+              <a:srgbClr val="C00000"/>
+            </a:solidFill>
+          </a:ln>
+        </p:spPr>
+        <p:style>
+          <a:lnRef idx="1">
+            <a:schemeClr val="accent1"/>
+          </a:lnRef>
+          <a:fillRef idx="0">
+            <a:schemeClr val="accent1"/>
+          </a:fillRef>
+          <a:effectRef idx="0">
+            <a:schemeClr val="accent1"/>
+          </a:effectRef>
+          <a:fontRef idx="minor">
+            <a:schemeClr val="tx1"/>
+          </a:fontRef>
+        </p:style>
+      </p:cxnSp>
+      <mc:AlternateContent xmlns:mc="http://schemas.openxmlformats.org/markup-compatibility/2006" xmlns:a14="http://schemas.microsoft.com/office/drawing/2010/main">
+        <mc:Choice Requires="a14">
           <p:sp>
             <p:nvSpPr>
               <p:cNvPr id="13" name="文本框 12">
@@ -3625,7 +3715,7 @@
             </p:nvSpPr>
             <p:spPr>
               <a:xfrm>
-                <a:off x="6589368" y="4756448"/>
+                <a:off x="6542890" y="5142126"/>
                 <a:ext cx="487506" cy="338554"/>
               </a:xfrm>
               <a:prstGeom prst="rect">
@@ -3639,6 +3729,7 @@
               </a:bodyPr>
               <a:lstStyle/>
               <a:p>
+                <a:pPr/>
                 <a14:m>
                   <m:oMathPara xmlns:m="http://schemas.openxmlformats.org/officeDocument/2006/math">
                     <m:oMathParaPr>
@@ -3683,7 +3774,7 @@
             </p:txBody>
           </p:sp>
         </mc:Choice>
-        <mc:Fallback>
+        <mc:Fallback xmlns="">
           <p:sp>
             <p:nvSpPr>
               <p:cNvPr id="13" name="文本框 12">
@@ -3700,7 +3791,7 @@
             </p:nvSpPr>
             <p:spPr>
               <a:xfrm>
-                <a:off x="6589368" y="4756448"/>
+                <a:off x="6542890" y="5142126"/>
                 <a:ext cx="487506" cy="338554"/>
               </a:xfrm>
               <a:prstGeom prst="rect">
@@ -3744,8 +3835,8 @@
         </p:nvCxnSpPr>
         <p:spPr>
           <a:xfrm flipH="1" flipV="1">
-            <a:off x="6096000" y="4034887"/>
-            <a:ext cx="522914" cy="481166"/>
+            <a:off x="5781251" y="3926753"/>
+            <a:ext cx="837663" cy="589300"/>
           </a:xfrm>
           <a:prstGeom prst="straightConnector1">
             <a:avLst/>
@@ -3770,8 +3861,8 @@
           </a:fontRef>
         </p:style>
       </p:cxnSp>
-      <mc:AlternateContent xmlns:mc="http://schemas.openxmlformats.org/markup-compatibility/2006">
-        <mc:Choice xmlns:a14="http://schemas.microsoft.com/office/drawing/2010/main" Requires="a14">
+      <mc:AlternateContent xmlns:mc="http://schemas.openxmlformats.org/markup-compatibility/2006" xmlns:a14="http://schemas.microsoft.com/office/drawing/2010/main">
+        <mc:Choice Requires="a14">
           <p:sp>
             <p:nvSpPr>
               <p:cNvPr id="24" name="文本框 23">
@@ -3786,7 +3877,7 @@
             </p:nvSpPr>
             <p:spPr>
               <a:xfrm>
-                <a:off x="6079621" y="3794492"/>
+                <a:off x="5546725" y="3953803"/>
                 <a:ext cx="496097" cy="338554"/>
               </a:xfrm>
               <a:prstGeom prst="rect">
@@ -3800,6 +3891,7 @@
               </a:bodyPr>
               <a:lstStyle/>
               <a:p>
+                <a:pPr/>
                 <a14:m>
                   <m:oMathPara xmlns:m="http://schemas.openxmlformats.org/officeDocument/2006/math">
                     <m:oMathParaPr>
@@ -3844,7 +3936,7 @@
             </p:txBody>
           </p:sp>
         </mc:Choice>
-        <mc:Fallback>
+        <mc:Fallback xmlns="">
           <p:sp>
             <p:nvSpPr>
               <p:cNvPr id="24" name="文本框 23">
@@ -3861,7 +3953,7 @@
             </p:nvSpPr>
             <p:spPr>
               <a:xfrm>
-                <a:off x="6079621" y="3794492"/>
+                <a:off x="5546725" y="3953803"/>
                 <a:ext cx="496097" cy="338554"/>
               </a:xfrm>
               <a:prstGeom prst="rect">
@@ -4014,17 +4106,17 @@
         </p:nvSpPr>
         <p:spPr>
           <a:xfrm rot="18811595">
-            <a:off x="3222382" y="1777598"/>
-            <a:ext cx="3926743" cy="1626083"/>
+            <a:off x="2850839" y="2135113"/>
+            <a:ext cx="3982013" cy="1567892"/>
           </a:xfrm>
           <a:prstGeom prst="parallelogram">
             <a:avLst>
-              <a:gd name="adj" fmla="val 105522"/>
+              <a:gd name="adj" fmla="val 106162"/>
             </a:avLst>
           </a:prstGeom>
           <a:solidFill>
-            <a:srgbClr val="CCCCCC">
-              <a:alpha val="89804"/>
+            <a:srgbClr val="DFDFDF">
+              <a:alpha val="80000"/>
             </a:srgbClr>
           </a:solidFill>
           <a:ln>
@@ -4052,7 +4144,7 @@
           <a:lstStyle/>
           <a:p>
             <a:pPr algn="ctr"/>
-            <a:endParaRPr lang="zh-CN" altLang="en-US"/>
+            <a:endParaRPr lang="zh-CN" altLang="en-US" dirty="0"/>
           </a:p>
         </p:txBody>
       </p:sp>
@@ -4072,12 +4164,13 @@
         </p:nvCxnSpPr>
         <p:spPr>
           <a:xfrm>
-            <a:off x="4974672" y="3043743"/>
-            <a:ext cx="1635853" cy="1452756"/>
+            <a:off x="4751459" y="3262509"/>
+            <a:ext cx="1859066" cy="1233990"/>
           </a:xfrm>
           <a:prstGeom prst="line">
             <a:avLst/>
           </a:prstGeom>
+          <a:ln w="12700" cap="rnd"/>
         </p:spPr>
         <p:style>
           <a:lnRef idx="1">
@@ -4094,6 +4187,3424 @@
           </a:fontRef>
         </p:style>
       </p:cxnSp>
+      <p:cxnSp>
+        <p:nvCxnSpPr>
+          <p:cNvPr id="4" name="直线箭头连接符 3">
+            <a:extLst>
+              <a:ext uri="{FF2B5EF4-FFF2-40B4-BE49-F238E27FC236}">
+                <a16:creationId xmlns:a16="http://schemas.microsoft.com/office/drawing/2014/main" id="{AAB14D07-5A42-A4F4-B0DF-E9E132267C15}"/>
+              </a:ext>
+            </a:extLst>
+          </p:cNvPr>
+          <p:cNvCxnSpPr>
+            <a:cxnSpLocks/>
+          </p:cNvCxnSpPr>
+          <p:nvPr/>
+        </p:nvCxnSpPr>
+        <p:spPr>
+          <a:xfrm flipV="1">
+            <a:off x="3522907" y="1678333"/>
+            <a:ext cx="2812771" cy="2827943"/>
+          </a:xfrm>
+          <a:prstGeom prst="straightConnector1">
+            <a:avLst/>
+          </a:prstGeom>
+          <a:ln w="19050" cap="rnd">
+            <a:solidFill>
+              <a:schemeClr val="accent5">
+                <a:alpha val="90000"/>
+              </a:schemeClr>
+            </a:solidFill>
+            <a:prstDash val="lgDash"/>
+            <a:headEnd type="none"/>
+            <a:tailEnd type="arrow" w="med" len="med"/>
+          </a:ln>
+        </p:spPr>
+        <p:style>
+          <a:lnRef idx="1">
+            <a:schemeClr val="accent1"/>
+          </a:lnRef>
+          <a:fillRef idx="0">
+            <a:schemeClr val="accent1"/>
+          </a:fillRef>
+          <a:effectRef idx="0">
+            <a:schemeClr val="accent1"/>
+          </a:effectRef>
+          <a:fontRef idx="minor">
+            <a:schemeClr val="tx1"/>
+          </a:fontRef>
+        </p:style>
+      </p:cxnSp>
+      <mc:AlternateContent xmlns:mc="http://schemas.openxmlformats.org/markup-compatibility/2006" xmlns:a14="http://schemas.microsoft.com/office/drawing/2010/main">
+        <mc:Choice Requires="a14">
+          <p:sp>
+            <p:nvSpPr>
+              <p:cNvPr id="21" name="文本框 20">
+                <a:extLst>
+                  <a:ext uri="{FF2B5EF4-FFF2-40B4-BE49-F238E27FC236}">
+                    <a16:creationId xmlns:a16="http://schemas.microsoft.com/office/drawing/2014/main" id="{7DF97A7D-F56A-13F1-20C3-452230D933BA}"/>
+                  </a:ext>
+                </a:extLst>
+              </p:cNvPr>
+              <p:cNvSpPr txBox="1"/>
+              <p:nvPr/>
+            </p:nvSpPr>
+            <p:spPr>
+              <a:xfrm>
+                <a:off x="6127859" y="1681375"/>
+                <a:ext cx="412100" cy="338554"/>
+              </a:xfrm>
+              <a:prstGeom prst="rect">
+                <a:avLst/>
+              </a:prstGeom>
+              <a:noFill/>
+            </p:spPr>
+            <p:txBody>
+              <a:bodyPr wrap="none" rtlCol="0">
+                <a:spAutoFit/>
+              </a:bodyPr>
+              <a:lstStyle/>
+              <a:p>
+                <a:pPr/>
+                <a14:m>
+                  <m:oMathPara xmlns:m="http://schemas.openxmlformats.org/officeDocument/2006/math">
+                    <m:oMathParaPr>
+                      <m:jc m:val="centerGroup"/>
+                    </m:oMathParaPr>
+                    <m:oMath xmlns:m="http://schemas.openxmlformats.org/officeDocument/2006/math">
+                      <m:r>
+                        <a:rPr lang="en-US" altLang="zh-CN" sz="1600" i="1" dirty="0" smtClean="0">
+                          <a:solidFill>
+                            <a:schemeClr val="accent5"/>
+                          </a:solidFill>
+                          <a:latin typeface="Cambria Math" panose="02040503050406030204" pitchFamily="18" charset="0"/>
+                        </a:rPr>
+                        <m:t>𝑥</m:t>
+                      </m:r>
+                    </m:oMath>
+                  </m:oMathPara>
+                </a14:m>
+                <a:endParaRPr lang="zh-CN" altLang="en-US" sz="1600" i="1" dirty="0">
+                  <a:solidFill>
+                    <a:schemeClr val="accent5"/>
+                  </a:solidFill>
+                  <a:latin typeface="Consolas" panose="020B0609020204030204" pitchFamily="49" charset="0"/>
+                </a:endParaRPr>
+              </a:p>
+            </p:txBody>
+          </p:sp>
+        </mc:Choice>
+        <mc:Fallback xmlns="">
+          <p:sp>
+            <p:nvSpPr>
+              <p:cNvPr id="21" name="文本框 20">
+                <a:extLst>
+                  <a:ext uri="{FF2B5EF4-FFF2-40B4-BE49-F238E27FC236}">
+                    <a16:creationId xmlns:a16="http://schemas.microsoft.com/office/drawing/2014/main" id="{7DF97A7D-F56A-13F1-20C3-452230D933BA}"/>
+                  </a:ext>
+                </a:extLst>
+              </p:cNvPr>
+              <p:cNvSpPr txBox="1">
+                <a:spLocks noRot="1" noChangeAspect="1" noMove="1" noResize="1" noEditPoints="1" noAdjustHandles="1" noChangeArrowheads="1" noChangeShapeType="1" noTextEdit="1"/>
+              </p:cNvSpPr>
+              <p:nvPr/>
+            </p:nvSpPr>
+            <p:spPr>
+              <a:xfrm>
+                <a:off x="6127859" y="1681375"/>
+                <a:ext cx="412100" cy="338554"/>
+              </a:xfrm>
+              <a:prstGeom prst="rect">
+                <a:avLst/>
+              </a:prstGeom>
+              <a:blipFill>
+                <a:blip r:embed="rId5"/>
+                <a:stretch>
+                  <a:fillRect/>
+                </a:stretch>
+              </a:blipFill>
+            </p:spPr>
+            <p:txBody>
+              <a:bodyPr/>
+              <a:lstStyle/>
+              <a:p>
+                <a:r>
+                  <a:rPr lang="zh-CN" altLang="en-US">
+                    <a:noFill/>
+                  </a:rPr>
+                  <a:t> </a:t>
+                </a:r>
+              </a:p>
+            </p:txBody>
+          </p:sp>
+        </mc:Fallback>
+      </mc:AlternateContent>
+      <mc:AlternateContent xmlns:mc="http://schemas.openxmlformats.org/markup-compatibility/2006" xmlns:a14="http://schemas.microsoft.com/office/drawing/2010/main">
+        <mc:Choice Requires="a14">
+          <p:sp>
+            <p:nvSpPr>
+              <p:cNvPr id="25" name="文本框 24">
+                <a:extLst>
+                  <a:ext uri="{FF2B5EF4-FFF2-40B4-BE49-F238E27FC236}">
+                    <a16:creationId xmlns:a16="http://schemas.microsoft.com/office/drawing/2014/main" id="{805A24B6-8225-270D-085B-125054C35CDB}"/>
+                  </a:ext>
+                </a:extLst>
+              </p:cNvPr>
+              <p:cNvSpPr txBox="1"/>
+              <p:nvPr/>
+            </p:nvSpPr>
+            <p:spPr>
+              <a:xfrm>
+                <a:off x="4714984" y="4795216"/>
+                <a:ext cx="415818" cy="338554"/>
+              </a:xfrm>
+              <a:prstGeom prst="rect">
+                <a:avLst/>
+              </a:prstGeom>
+              <a:noFill/>
+            </p:spPr>
+            <p:txBody>
+              <a:bodyPr wrap="none" rtlCol="0">
+                <a:spAutoFit/>
+              </a:bodyPr>
+              <a:lstStyle/>
+              <a:p>
+                <a:pPr/>
+                <a14:m>
+                  <m:oMathPara xmlns:m="http://schemas.openxmlformats.org/officeDocument/2006/math">
+                    <m:oMathParaPr>
+                      <m:jc m:val="centerGroup"/>
+                    </m:oMathParaPr>
+                    <m:oMath xmlns:m="http://schemas.openxmlformats.org/officeDocument/2006/math">
+                      <m:r>
+                        <a:rPr lang="en-US" altLang="zh-CN" sz="1600" b="0" i="1" smtClean="0">
+                          <a:solidFill>
+                            <a:schemeClr val="accent5"/>
+                          </a:solidFill>
+                          <a:latin typeface="Cambria Math" panose="02040503050406030204" pitchFamily="18" charset="0"/>
+                        </a:rPr>
+                        <m:t>𝑦</m:t>
+                      </m:r>
+                    </m:oMath>
+                  </m:oMathPara>
+                </a14:m>
+                <a:endParaRPr lang="en-US" altLang="zh-CN" sz="1600" b="0" i="1" dirty="0">
+                  <a:solidFill>
+                    <a:schemeClr val="accent5"/>
+                  </a:solidFill>
+                  <a:latin typeface="Consolas" panose="020B0609020204030204" pitchFamily="49" charset="0"/>
+                </a:endParaRPr>
+              </a:p>
+            </p:txBody>
+          </p:sp>
+        </mc:Choice>
+        <mc:Fallback xmlns="">
+          <p:sp>
+            <p:nvSpPr>
+              <p:cNvPr id="25" name="文本框 24">
+                <a:extLst>
+                  <a:ext uri="{FF2B5EF4-FFF2-40B4-BE49-F238E27FC236}">
+                    <a16:creationId xmlns:a16="http://schemas.microsoft.com/office/drawing/2014/main" id="{805A24B6-8225-270D-085B-125054C35CDB}"/>
+                  </a:ext>
+                </a:extLst>
+              </p:cNvPr>
+              <p:cNvSpPr txBox="1">
+                <a:spLocks noRot="1" noChangeAspect="1" noMove="1" noResize="1" noEditPoints="1" noAdjustHandles="1" noChangeArrowheads="1" noChangeShapeType="1" noTextEdit="1"/>
+              </p:cNvSpPr>
+              <p:nvPr/>
+            </p:nvSpPr>
+            <p:spPr>
+              <a:xfrm>
+                <a:off x="4714984" y="4795216"/>
+                <a:ext cx="415818" cy="338554"/>
+              </a:xfrm>
+              <a:prstGeom prst="rect">
+                <a:avLst/>
+              </a:prstGeom>
+              <a:blipFill>
+                <a:blip r:embed="rId6"/>
+                <a:stretch>
+                  <a:fillRect b="-3571"/>
+                </a:stretch>
+              </a:blipFill>
+            </p:spPr>
+            <p:txBody>
+              <a:bodyPr/>
+              <a:lstStyle/>
+              <a:p>
+                <a:r>
+                  <a:rPr lang="zh-CN" altLang="en-US">
+                    <a:noFill/>
+                  </a:rPr>
+                  <a:t> </a:t>
+                </a:r>
+              </a:p>
+            </p:txBody>
+          </p:sp>
+        </mc:Fallback>
+      </mc:AlternateContent>
+      <p:cxnSp>
+        <p:nvCxnSpPr>
+          <p:cNvPr id="18" name="直线连接符 17">
+            <a:extLst>
+              <a:ext uri="{FF2B5EF4-FFF2-40B4-BE49-F238E27FC236}">
+                <a16:creationId xmlns:a16="http://schemas.microsoft.com/office/drawing/2014/main" id="{00BD2315-2EE7-9BB3-E963-B0A13C4927CA}"/>
+              </a:ext>
+            </a:extLst>
+          </p:cNvPr>
+          <p:cNvCxnSpPr>
+            <a:cxnSpLocks/>
+          </p:cNvCxnSpPr>
+          <p:nvPr/>
+        </p:nvCxnSpPr>
+        <p:spPr>
+          <a:xfrm>
+            <a:off x="5349879" y="2395468"/>
+            <a:ext cx="1266176" cy="2099528"/>
+          </a:xfrm>
+          <a:prstGeom prst="line">
+            <a:avLst/>
+          </a:prstGeom>
+          <a:ln w="19050">
+            <a:solidFill>
+              <a:srgbClr val="C00000"/>
+            </a:solidFill>
+          </a:ln>
+        </p:spPr>
+        <p:style>
+          <a:lnRef idx="1">
+            <a:schemeClr val="accent1"/>
+          </a:lnRef>
+          <a:fillRef idx="0">
+            <a:schemeClr val="accent1"/>
+          </a:fillRef>
+          <a:effectRef idx="0">
+            <a:schemeClr val="accent1"/>
+          </a:effectRef>
+          <a:fontRef idx="minor">
+            <a:schemeClr val="tx1"/>
+          </a:fontRef>
+        </p:style>
+      </p:cxnSp>
+      <p:cxnSp>
+        <p:nvCxnSpPr>
+          <p:cNvPr id="29" name="直线箭头连接符 28">
+            <a:extLst>
+              <a:ext uri="{FF2B5EF4-FFF2-40B4-BE49-F238E27FC236}">
+                <a16:creationId xmlns:a16="http://schemas.microsoft.com/office/drawing/2014/main" id="{4E697603-F122-9A8F-44A8-85640207961D}"/>
+              </a:ext>
+            </a:extLst>
+          </p:cNvPr>
+          <p:cNvCxnSpPr>
+            <a:cxnSpLocks/>
+          </p:cNvCxnSpPr>
+          <p:nvPr/>
+        </p:nvCxnSpPr>
+        <p:spPr>
+          <a:xfrm flipV="1">
+            <a:off x="4067240" y="663158"/>
+            <a:ext cx="1850771" cy="1928979"/>
+          </a:xfrm>
+          <a:prstGeom prst="straightConnector1">
+            <a:avLst/>
+          </a:prstGeom>
+          <a:ln w="19050" cap="rnd">
+            <a:solidFill>
+              <a:schemeClr val="bg1">
+                <a:lumMod val="50000"/>
+                <a:alpha val="90000"/>
+              </a:schemeClr>
+            </a:solidFill>
+            <a:prstDash val="lgDash"/>
+            <a:headEnd type="none"/>
+            <a:tailEnd type="arrow" w="med" len="med"/>
+          </a:ln>
+        </p:spPr>
+        <p:style>
+          <a:lnRef idx="1">
+            <a:schemeClr val="accent1"/>
+          </a:lnRef>
+          <a:fillRef idx="0">
+            <a:schemeClr val="accent1"/>
+          </a:fillRef>
+          <a:effectRef idx="0">
+            <a:schemeClr val="accent1"/>
+          </a:effectRef>
+          <a:fontRef idx="minor">
+            <a:schemeClr val="tx1"/>
+          </a:fontRef>
+        </p:style>
+      </p:cxnSp>
+      <p:cxnSp>
+        <p:nvCxnSpPr>
+          <p:cNvPr id="32" name="直接箭头连接符 25">
+            <a:extLst>
+              <a:ext uri="{FF2B5EF4-FFF2-40B4-BE49-F238E27FC236}">
+                <a16:creationId xmlns:a16="http://schemas.microsoft.com/office/drawing/2014/main" id="{233494E7-CE42-34C9-CA9C-D551F77ABB83}"/>
+              </a:ext>
+            </a:extLst>
+          </p:cNvPr>
+          <p:cNvCxnSpPr>
+            <a:cxnSpLocks/>
+          </p:cNvCxnSpPr>
+          <p:nvPr/>
+        </p:nvCxnSpPr>
+        <p:spPr>
+          <a:xfrm flipV="1">
+            <a:off x="5345111" y="2424225"/>
+            <a:ext cx="0" cy="252000"/>
+          </a:xfrm>
+          <a:prstGeom prst="straightConnector1">
+            <a:avLst/>
+          </a:prstGeom>
+          <a:ln w="44450">
+            <a:tailEnd type="triangle"/>
+          </a:ln>
+        </p:spPr>
+        <p:style>
+          <a:lnRef idx="1">
+            <a:schemeClr val="accent1"/>
+          </a:lnRef>
+          <a:fillRef idx="0">
+            <a:schemeClr val="accent1"/>
+          </a:fillRef>
+          <a:effectRef idx="0">
+            <a:schemeClr val="accent1"/>
+          </a:effectRef>
+          <a:fontRef idx="minor">
+            <a:schemeClr val="tx1"/>
+          </a:fontRef>
+        </p:style>
+      </p:cxnSp>
+      <p:sp>
+        <p:nvSpPr>
+          <p:cNvPr id="33" name="椭圆 32">
+            <a:extLst>
+              <a:ext uri="{FF2B5EF4-FFF2-40B4-BE49-F238E27FC236}">
+                <a16:creationId xmlns:a16="http://schemas.microsoft.com/office/drawing/2014/main" id="{5F51FAE2-368F-8500-A218-EDA9F8DC739C}"/>
+              </a:ext>
+            </a:extLst>
+          </p:cNvPr>
+          <p:cNvSpPr>
+            <a:spLocks noChangeAspect="1"/>
+          </p:cNvSpPr>
+          <p:nvPr/>
+        </p:nvSpPr>
+        <p:spPr>
+          <a:xfrm flipV="1">
+            <a:off x="5308727" y="2359468"/>
+            <a:ext cx="72000" cy="72000"/>
+          </a:xfrm>
+          <a:prstGeom prst="ellipse">
+            <a:avLst/>
+          </a:prstGeom>
+          <a:ln>
+            <a:noFill/>
+          </a:ln>
+        </p:spPr>
+        <p:style>
+          <a:lnRef idx="2">
+            <a:schemeClr val="accent1">
+              <a:shade val="50000"/>
+            </a:schemeClr>
+          </a:lnRef>
+          <a:fillRef idx="1">
+            <a:schemeClr val="accent1"/>
+          </a:fillRef>
+          <a:effectRef idx="0">
+            <a:schemeClr val="accent1"/>
+          </a:effectRef>
+          <a:fontRef idx="minor">
+            <a:schemeClr val="lt1"/>
+          </a:fontRef>
+        </p:style>
+        <p:txBody>
+          <a:bodyPr rtlCol="0" anchor="ctr"/>
+          <a:lstStyle/>
+          <a:p>
+            <a:pPr algn="ctr"/>
+            <a:endParaRPr lang="zh-CN" altLang="en-US"/>
+          </a:p>
+        </p:txBody>
+      </p:sp>
+      <p:cxnSp>
+        <p:nvCxnSpPr>
+          <p:cNvPr id="46" name="直线箭头连接符 45">
+            <a:extLst>
+              <a:ext uri="{FF2B5EF4-FFF2-40B4-BE49-F238E27FC236}">
+                <a16:creationId xmlns:a16="http://schemas.microsoft.com/office/drawing/2014/main" id="{89DDD77D-E45A-E814-DDFD-995A8B7425F4}"/>
+              </a:ext>
+            </a:extLst>
+          </p:cNvPr>
+          <p:cNvCxnSpPr>
+            <a:cxnSpLocks/>
+          </p:cNvCxnSpPr>
+          <p:nvPr/>
+        </p:nvCxnSpPr>
+        <p:spPr>
+          <a:xfrm>
+            <a:off x="4049118" y="2602770"/>
+            <a:ext cx="0" cy="2598559"/>
+          </a:xfrm>
+          <a:prstGeom prst="straightConnector1">
+            <a:avLst/>
+          </a:prstGeom>
+          <a:ln w="19050" cap="rnd">
+            <a:solidFill>
+              <a:schemeClr val="bg1">
+                <a:lumMod val="50000"/>
+                <a:alpha val="90000"/>
+              </a:schemeClr>
+            </a:solidFill>
+            <a:prstDash val="lgDash"/>
+            <a:headEnd type="none"/>
+            <a:tailEnd type="arrow" w="med" len="med"/>
+          </a:ln>
+        </p:spPr>
+        <p:style>
+          <a:lnRef idx="1">
+            <a:schemeClr val="accent1"/>
+          </a:lnRef>
+          <a:fillRef idx="0">
+            <a:schemeClr val="accent1"/>
+          </a:fillRef>
+          <a:effectRef idx="0">
+            <a:schemeClr val="accent1"/>
+          </a:effectRef>
+          <a:fontRef idx="minor">
+            <a:schemeClr val="tx1"/>
+          </a:fontRef>
+        </p:style>
+      </p:cxnSp>
+      <mc:AlternateContent xmlns:mc="http://schemas.openxmlformats.org/markup-compatibility/2006" xmlns:a14="http://schemas.microsoft.com/office/drawing/2010/main">
+        <mc:Choice Requires="a14">
+          <p:sp>
+            <p:nvSpPr>
+              <p:cNvPr id="49" name="文本框 48">
+                <a:extLst>
+                  <a:ext uri="{FF2B5EF4-FFF2-40B4-BE49-F238E27FC236}">
+                    <a16:creationId xmlns:a16="http://schemas.microsoft.com/office/drawing/2014/main" id="{79DD6B12-599A-2809-02A3-889D23BE437B}"/>
+                  </a:ext>
+                </a:extLst>
+              </p:cNvPr>
+              <p:cNvSpPr txBox="1"/>
+              <p:nvPr/>
+            </p:nvSpPr>
+            <p:spPr>
+              <a:xfrm>
+                <a:off x="4008130" y="4934025"/>
+                <a:ext cx="415114" cy="338554"/>
+              </a:xfrm>
+              <a:prstGeom prst="rect">
+                <a:avLst/>
+              </a:prstGeom>
+              <a:noFill/>
+              <a:ln>
+                <a:noFill/>
+              </a:ln>
+            </p:spPr>
+            <p:txBody>
+              <a:bodyPr wrap="none" rtlCol="0">
+                <a:spAutoFit/>
+              </a:bodyPr>
+              <a:lstStyle/>
+              <a:p>
+                <a:pPr/>
+                <a14:m>
+                  <m:oMathPara xmlns:m="http://schemas.openxmlformats.org/officeDocument/2006/math">
+                    <m:oMathParaPr>
+                      <m:jc m:val="centerGroup"/>
+                    </m:oMathParaPr>
+                    <m:oMath xmlns:m="http://schemas.openxmlformats.org/officeDocument/2006/math">
+                      <m:r>
+                        <a:rPr lang="en-US" altLang="zh-CN" sz="1600" b="0" i="1" smtClean="0">
+                          <a:solidFill>
+                            <a:schemeClr val="bg1">
+                              <a:lumMod val="50000"/>
+                            </a:schemeClr>
+                          </a:solidFill>
+                          <a:latin typeface="Cambria Math" panose="02040503050406030204" pitchFamily="18" charset="0"/>
+                        </a:rPr>
+                        <m:t>𝑣</m:t>
+                      </m:r>
+                    </m:oMath>
+                  </m:oMathPara>
+                </a14:m>
+                <a:endParaRPr lang="en-US" altLang="zh-CN" sz="1600" b="0" i="1" dirty="0">
+                  <a:solidFill>
+                    <a:schemeClr val="bg1">
+                      <a:lumMod val="50000"/>
+                    </a:schemeClr>
+                  </a:solidFill>
+                  <a:latin typeface="Consolas" panose="020B0609020204030204" pitchFamily="49" charset="0"/>
+                </a:endParaRPr>
+              </a:p>
+            </p:txBody>
+          </p:sp>
+        </mc:Choice>
+        <mc:Fallback xmlns="">
+          <p:sp>
+            <p:nvSpPr>
+              <p:cNvPr id="49" name="文本框 48">
+                <a:extLst>
+                  <a:ext uri="{FF2B5EF4-FFF2-40B4-BE49-F238E27FC236}">
+                    <a16:creationId xmlns:a16="http://schemas.microsoft.com/office/drawing/2014/main" id="{79DD6B12-599A-2809-02A3-889D23BE437B}"/>
+                  </a:ext>
+                </a:extLst>
+              </p:cNvPr>
+              <p:cNvSpPr txBox="1">
+                <a:spLocks noRot="1" noChangeAspect="1" noMove="1" noResize="1" noEditPoints="1" noAdjustHandles="1" noChangeArrowheads="1" noChangeShapeType="1" noTextEdit="1"/>
+              </p:cNvSpPr>
+              <p:nvPr/>
+            </p:nvSpPr>
+            <p:spPr>
+              <a:xfrm>
+                <a:off x="4008130" y="4934025"/>
+                <a:ext cx="415114" cy="338554"/>
+              </a:xfrm>
+              <a:prstGeom prst="rect">
+                <a:avLst/>
+              </a:prstGeom>
+              <a:blipFill>
+                <a:blip r:embed="rId7"/>
+                <a:stretch>
+                  <a:fillRect/>
+                </a:stretch>
+              </a:blipFill>
+              <a:ln>
+                <a:noFill/>
+              </a:ln>
+            </p:spPr>
+            <p:txBody>
+              <a:bodyPr/>
+              <a:lstStyle/>
+              <a:p>
+                <a:r>
+                  <a:rPr lang="zh-CN" altLang="en-US">
+                    <a:noFill/>
+                  </a:rPr>
+                  <a:t> </a:t>
+                </a:r>
+              </a:p>
+            </p:txBody>
+          </p:sp>
+        </mc:Fallback>
+      </mc:AlternateContent>
+      <mc:AlternateContent xmlns:mc="http://schemas.openxmlformats.org/markup-compatibility/2006" xmlns:a14="http://schemas.microsoft.com/office/drawing/2010/main">
+        <mc:Choice Requires="a14">
+          <p:sp>
+            <p:nvSpPr>
+              <p:cNvPr id="50" name="文本框 49">
+                <a:extLst>
+                  <a:ext uri="{FF2B5EF4-FFF2-40B4-BE49-F238E27FC236}">
+                    <a16:creationId xmlns:a16="http://schemas.microsoft.com/office/drawing/2014/main" id="{97639C60-2DFA-6E9C-C679-1459B16F4321}"/>
+                  </a:ext>
+                </a:extLst>
+              </p:cNvPr>
+              <p:cNvSpPr txBox="1"/>
+              <p:nvPr/>
+            </p:nvSpPr>
+            <p:spPr>
+              <a:xfrm>
+                <a:off x="5753182" y="652212"/>
+                <a:ext cx="419089" cy="338554"/>
+              </a:xfrm>
+              <a:prstGeom prst="rect">
+                <a:avLst/>
+              </a:prstGeom>
+              <a:noFill/>
+              <a:ln>
+                <a:noFill/>
+              </a:ln>
+            </p:spPr>
+            <p:txBody>
+              <a:bodyPr wrap="none" rtlCol="0">
+                <a:spAutoFit/>
+              </a:bodyPr>
+              <a:lstStyle/>
+              <a:p>
+                <a:pPr/>
+                <a14:m>
+                  <m:oMathPara xmlns:m="http://schemas.openxmlformats.org/officeDocument/2006/math">
+                    <m:oMathParaPr>
+                      <m:jc m:val="centerGroup"/>
+                    </m:oMathParaPr>
+                    <m:oMath xmlns:m="http://schemas.openxmlformats.org/officeDocument/2006/math">
+                      <m:r>
+                        <a:rPr lang="en-US" altLang="zh-CN" sz="1600" i="1" dirty="0" smtClean="0">
+                          <a:solidFill>
+                            <a:schemeClr val="bg1">
+                              <a:lumMod val="50000"/>
+                            </a:schemeClr>
+                          </a:solidFill>
+                          <a:latin typeface="Cambria Math" panose="02040503050406030204" pitchFamily="18" charset="0"/>
+                        </a:rPr>
+                        <m:t>𝑢</m:t>
+                      </m:r>
+                    </m:oMath>
+                  </m:oMathPara>
+                </a14:m>
+                <a:endParaRPr lang="en-US" altLang="zh-CN" sz="1600" b="0" i="1" dirty="0">
+                  <a:solidFill>
+                    <a:schemeClr val="bg1">
+                      <a:lumMod val="50000"/>
+                    </a:schemeClr>
+                  </a:solidFill>
+                  <a:latin typeface="Consolas" panose="020B0609020204030204" pitchFamily="49" charset="0"/>
+                </a:endParaRPr>
+              </a:p>
+            </p:txBody>
+          </p:sp>
+        </mc:Choice>
+        <mc:Fallback xmlns="">
+          <p:sp>
+            <p:nvSpPr>
+              <p:cNvPr id="50" name="文本框 49">
+                <a:extLst>
+                  <a:ext uri="{FF2B5EF4-FFF2-40B4-BE49-F238E27FC236}">
+                    <a16:creationId xmlns:a16="http://schemas.microsoft.com/office/drawing/2014/main" id="{97639C60-2DFA-6E9C-C679-1459B16F4321}"/>
+                  </a:ext>
+                </a:extLst>
+              </p:cNvPr>
+              <p:cNvSpPr txBox="1">
+                <a:spLocks noRot="1" noChangeAspect="1" noMove="1" noResize="1" noEditPoints="1" noAdjustHandles="1" noChangeArrowheads="1" noChangeShapeType="1" noTextEdit="1"/>
+              </p:cNvSpPr>
+              <p:nvPr/>
+            </p:nvSpPr>
+            <p:spPr>
+              <a:xfrm>
+                <a:off x="5753182" y="652212"/>
+                <a:ext cx="419089" cy="338554"/>
+              </a:xfrm>
+              <a:prstGeom prst="rect">
+                <a:avLst/>
+              </a:prstGeom>
+              <a:blipFill>
+                <a:blip r:embed="rId8"/>
+                <a:stretch>
+                  <a:fillRect/>
+                </a:stretch>
+              </a:blipFill>
+              <a:ln>
+                <a:noFill/>
+              </a:ln>
+            </p:spPr>
+            <p:txBody>
+              <a:bodyPr/>
+              <a:lstStyle/>
+              <a:p>
+                <a:r>
+                  <a:rPr lang="zh-CN" altLang="en-US">
+                    <a:noFill/>
+                  </a:rPr>
+                  <a:t> </a:t>
+                </a:r>
+              </a:p>
+            </p:txBody>
+          </p:sp>
+        </mc:Fallback>
+      </mc:AlternateContent>
+      <mc:AlternateContent xmlns:mc="http://schemas.openxmlformats.org/markup-compatibility/2006" xmlns:a14="http://schemas.microsoft.com/office/drawing/2010/main">
+        <mc:Choice Requires="a14">
+          <p:sp>
+            <p:nvSpPr>
+              <p:cNvPr id="53" name="文本框 52">
+                <a:extLst>
+                  <a:ext uri="{FF2B5EF4-FFF2-40B4-BE49-F238E27FC236}">
+                    <a16:creationId xmlns:a16="http://schemas.microsoft.com/office/drawing/2014/main" id="{3B477B60-B1E5-B6BB-57E8-EC0117C817C7}"/>
+                  </a:ext>
+                </a:extLst>
+              </p:cNvPr>
+              <p:cNvSpPr txBox="1"/>
+              <p:nvPr/>
+            </p:nvSpPr>
+            <p:spPr>
+              <a:xfrm>
+                <a:off x="2967917" y="2004892"/>
+                <a:ext cx="399789" cy="338554"/>
+              </a:xfrm>
+              <a:prstGeom prst="rect">
+                <a:avLst/>
+              </a:prstGeom>
+              <a:noFill/>
+            </p:spPr>
+            <p:txBody>
+              <a:bodyPr wrap="none" rtlCol="0">
+                <a:spAutoFit/>
+              </a:bodyPr>
+              <a:lstStyle/>
+              <a:p>
+                <a:pPr/>
+                <a14:m>
+                  <m:oMathPara xmlns:m="http://schemas.openxmlformats.org/officeDocument/2006/math">
+                    <m:oMathParaPr>
+                      <m:jc m:val="centerGroup"/>
+                    </m:oMathParaPr>
+                    <m:oMath xmlns:m="http://schemas.openxmlformats.org/officeDocument/2006/math">
+                      <m:r>
+                        <a:rPr lang="en-US" altLang="zh-CN" sz="1600" b="0" i="1" smtClean="0">
+                          <a:solidFill>
+                            <a:schemeClr val="accent1"/>
+                          </a:solidFill>
+                          <a:latin typeface="Cambria Math" panose="02040503050406030204" pitchFamily="18" charset="0"/>
+                        </a:rPr>
+                        <m:t>𝑧</m:t>
+                      </m:r>
+                    </m:oMath>
+                  </m:oMathPara>
+                </a14:m>
+                <a:endParaRPr lang="zh-CN" altLang="en-US" sz="1600" i="1" dirty="0">
+                  <a:solidFill>
+                    <a:schemeClr val="accent1"/>
+                  </a:solidFill>
+                  <a:latin typeface="Consolas" panose="020B0609020204030204" pitchFamily="49" charset="0"/>
+                </a:endParaRPr>
+              </a:p>
+            </p:txBody>
+          </p:sp>
+        </mc:Choice>
+        <mc:Fallback xmlns="">
+          <p:sp>
+            <p:nvSpPr>
+              <p:cNvPr id="53" name="文本框 52">
+                <a:extLst>
+                  <a:ext uri="{FF2B5EF4-FFF2-40B4-BE49-F238E27FC236}">
+                    <a16:creationId xmlns:a16="http://schemas.microsoft.com/office/drawing/2014/main" id="{3B477B60-B1E5-B6BB-57E8-EC0117C817C7}"/>
+                  </a:ext>
+                </a:extLst>
+              </p:cNvPr>
+              <p:cNvSpPr txBox="1">
+                <a:spLocks noRot="1" noChangeAspect="1" noMove="1" noResize="1" noEditPoints="1" noAdjustHandles="1" noChangeArrowheads="1" noChangeShapeType="1" noTextEdit="1"/>
+              </p:cNvSpPr>
+              <p:nvPr/>
+            </p:nvSpPr>
+            <p:spPr>
+              <a:xfrm>
+                <a:off x="2967917" y="2004892"/>
+                <a:ext cx="399789" cy="338554"/>
+              </a:xfrm>
+              <a:prstGeom prst="rect">
+                <a:avLst/>
+              </a:prstGeom>
+              <a:blipFill>
+                <a:blip r:embed="rId9"/>
+                <a:stretch>
+                  <a:fillRect/>
+                </a:stretch>
+              </a:blipFill>
+            </p:spPr>
+            <p:txBody>
+              <a:bodyPr/>
+              <a:lstStyle/>
+              <a:p>
+                <a:r>
+                  <a:rPr lang="zh-CN" altLang="en-US">
+                    <a:noFill/>
+                  </a:rPr>
+                  <a:t> </a:t>
+                </a:r>
+              </a:p>
+            </p:txBody>
+          </p:sp>
+        </mc:Fallback>
+      </mc:AlternateContent>
+      <mc:AlternateContent xmlns:mc="http://schemas.openxmlformats.org/markup-compatibility/2006" xmlns:a14="http://schemas.microsoft.com/office/drawing/2010/main">
+        <mc:Choice Requires="a14">
+          <p:sp>
+            <p:nvSpPr>
+              <p:cNvPr id="66" name="文本框 65">
+                <a:extLst>
+                  <a:ext uri="{FF2B5EF4-FFF2-40B4-BE49-F238E27FC236}">
+                    <a16:creationId xmlns:a16="http://schemas.microsoft.com/office/drawing/2014/main" id="{4B65F019-93A3-DC86-E3B8-68466BD5B13A}"/>
+                  </a:ext>
+                </a:extLst>
+              </p:cNvPr>
+              <p:cNvSpPr txBox="1"/>
+              <p:nvPr/>
+            </p:nvSpPr>
+            <p:spPr>
+              <a:xfrm rot="18591921">
+                <a:off x="3879271" y="4303776"/>
+                <a:ext cx="798104" cy="369332"/>
+              </a:xfrm>
+              <a:prstGeom prst="rect">
+                <a:avLst/>
+              </a:prstGeom>
+              <a:noFill/>
+            </p:spPr>
+            <p:txBody>
+              <a:bodyPr wrap="none" rtlCol="0">
+                <a:spAutoFit/>
+              </a:bodyPr>
+              <a:lstStyle/>
+              <a:p>
+                <a:pPr/>
+                <a14:m>
+                  <m:oMathPara xmlns:m="http://schemas.openxmlformats.org/officeDocument/2006/math">
+                    <m:oMathParaPr>
+                      <m:jc m:val="centerGroup"/>
+                    </m:oMathParaPr>
+                    <m:oMath xmlns:m="http://schemas.openxmlformats.org/officeDocument/2006/math">
+                      <m:r>
+                        <a:rPr kumimoji="1" lang="en-US" altLang="zh-CN" i="1" dirty="0" smtClean="0">
+                          <a:solidFill>
+                            <a:schemeClr val="bg1">
+                              <a:lumMod val="50000"/>
+                            </a:schemeClr>
+                          </a:solidFill>
+                          <a:latin typeface="Cambria Math" panose="02040503050406030204" pitchFamily="18" charset="0"/>
+                        </a:rPr>
+                        <m:t>𝑧</m:t>
+                      </m:r>
+                      <m:r>
+                        <a:rPr kumimoji="1" lang="en-US" altLang="zh-CN" i="1" dirty="0" smtClean="0">
+                          <a:solidFill>
+                            <a:schemeClr val="bg1">
+                              <a:lumMod val="50000"/>
+                            </a:schemeClr>
+                          </a:solidFill>
+                          <a:latin typeface="Cambria Math" panose="02040503050406030204" pitchFamily="18" charset="0"/>
+                        </a:rPr>
+                        <m:t>=</m:t>
+                      </m:r>
+                      <m:r>
+                        <a:rPr kumimoji="1" lang="en-US" altLang="zh-CN" i="1" dirty="0">
+                          <a:solidFill>
+                            <a:schemeClr val="bg1">
+                              <a:lumMod val="50000"/>
+                            </a:schemeClr>
+                          </a:solidFill>
+                          <a:latin typeface="Cambria Math" panose="02040503050406030204" pitchFamily="18" charset="0"/>
+                        </a:rPr>
+                        <m:t>𝑓</m:t>
+                      </m:r>
+                    </m:oMath>
+                  </m:oMathPara>
+                </a14:m>
+                <a:endParaRPr kumimoji="1" lang="zh-CN" altLang="en-US" dirty="0">
+                  <a:solidFill>
+                    <a:schemeClr val="bg1">
+                      <a:lumMod val="50000"/>
+                    </a:schemeClr>
+                  </a:solidFill>
+                </a:endParaRPr>
+              </a:p>
+            </p:txBody>
+          </p:sp>
+        </mc:Choice>
+        <mc:Fallback xmlns="">
+          <p:sp>
+            <p:nvSpPr>
+              <p:cNvPr id="66" name="文本框 65">
+                <a:extLst>
+                  <a:ext uri="{FF2B5EF4-FFF2-40B4-BE49-F238E27FC236}">
+                    <a16:creationId xmlns:a16="http://schemas.microsoft.com/office/drawing/2014/main" id="{4B65F019-93A3-DC86-E3B8-68466BD5B13A}"/>
+                  </a:ext>
+                </a:extLst>
+              </p:cNvPr>
+              <p:cNvSpPr txBox="1">
+                <a:spLocks noRot="1" noChangeAspect="1" noMove="1" noResize="1" noEditPoints="1" noAdjustHandles="1" noChangeArrowheads="1" noChangeShapeType="1" noTextEdit="1"/>
+              </p:cNvSpPr>
+              <p:nvPr/>
+            </p:nvSpPr>
+            <p:spPr>
+              <a:xfrm rot="18591921">
+                <a:off x="3879271" y="4303776"/>
+                <a:ext cx="798104" cy="369332"/>
+              </a:xfrm>
+              <a:prstGeom prst="rect">
+                <a:avLst/>
+              </a:prstGeom>
+              <a:blipFill>
+                <a:blip r:embed="rId10"/>
+                <a:stretch>
+                  <a:fillRect r="-3125"/>
+                </a:stretch>
+              </a:blipFill>
+            </p:spPr>
+            <p:txBody>
+              <a:bodyPr/>
+              <a:lstStyle/>
+              <a:p>
+                <a:r>
+                  <a:rPr lang="zh-CN" altLang="en-US">
+                    <a:noFill/>
+                  </a:rPr>
+                  <a:t> </a:t>
+                </a:r>
+              </a:p>
+            </p:txBody>
+          </p:sp>
+        </mc:Fallback>
+      </mc:AlternateContent>
+      <mc:AlternateContent xmlns:mc="http://schemas.openxmlformats.org/markup-compatibility/2006" xmlns:a14="http://schemas.microsoft.com/office/drawing/2010/main">
+        <mc:Choice Requires="a14">
+          <p:sp>
+            <p:nvSpPr>
+              <p:cNvPr id="67" name="文本框 66">
+                <a:extLst>
+                  <a:ext uri="{FF2B5EF4-FFF2-40B4-BE49-F238E27FC236}">
+                    <a16:creationId xmlns:a16="http://schemas.microsoft.com/office/drawing/2014/main" id="{C9627B49-E75A-6623-CE34-52E4C0A02626}"/>
+                  </a:ext>
+                </a:extLst>
+              </p:cNvPr>
+              <p:cNvSpPr txBox="1"/>
+              <p:nvPr/>
+            </p:nvSpPr>
+            <p:spPr>
+              <a:xfrm>
+                <a:off x="6567248" y="4378574"/>
+                <a:ext cx="506934" cy="338554"/>
+              </a:xfrm>
+              <a:prstGeom prst="rect">
+                <a:avLst/>
+              </a:prstGeom>
+              <a:noFill/>
+            </p:spPr>
+            <p:txBody>
+              <a:bodyPr wrap="none" rtlCol="0">
+                <a:spAutoFit/>
+              </a:bodyPr>
+              <a:lstStyle/>
+              <a:p>
+                <a:pPr/>
+                <a14:m>
+                  <m:oMathPara xmlns:m="http://schemas.openxmlformats.org/officeDocument/2006/math">
+                    <m:oMathParaPr>
+                      <m:jc m:val="centerGroup"/>
+                    </m:oMathParaPr>
+                    <m:oMath xmlns:m="http://schemas.openxmlformats.org/officeDocument/2006/math">
+                      <m:sSub>
+                        <m:sSubPr>
+                          <m:ctrlPr>
+                            <a:rPr lang="en-US" altLang="zh-CN" sz="1600" b="0" i="1" smtClean="0">
+                              <a:latin typeface="Cambria Math" panose="02040503050406030204" pitchFamily="18" charset="0"/>
+                            </a:rPr>
+                          </m:ctrlPr>
+                        </m:sSubPr>
+                        <m:e>
+                          <m:r>
+                            <a:rPr lang="en-US" altLang="zh-CN" sz="1600" b="0" i="1" smtClean="0">
+                              <a:latin typeface="Cambria Math" panose="02040503050406030204" pitchFamily="18" charset="0"/>
+                            </a:rPr>
+                            <m:t>𝑂</m:t>
+                          </m:r>
+                        </m:e>
+                        <m:sub>
+                          <m:r>
+                            <a:rPr lang="en-US" altLang="zh-CN" sz="1600" b="0" i="1" smtClean="0">
+                              <a:latin typeface="Cambria Math" panose="02040503050406030204" pitchFamily="18" charset="0"/>
+                            </a:rPr>
+                            <m:t>𝑐</m:t>
+                          </m:r>
+                        </m:sub>
+                      </m:sSub>
+                    </m:oMath>
+                  </m:oMathPara>
+                </a14:m>
+                <a:endParaRPr lang="zh-CN" altLang="en-US" sz="1600" i="1" dirty="0">
+                  <a:latin typeface="Consolas" panose="020B0609020204030204" pitchFamily="49" charset="0"/>
+                </a:endParaRPr>
+              </a:p>
+            </p:txBody>
+          </p:sp>
+        </mc:Choice>
+        <mc:Fallback xmlns="">
+          <p:sp>
+            <p:nvSpPr>
+              <p:cNvPr id="67" name="文本框 66">
+                <a:extLst>
+                  <a:ext uri="{FF2B5EF4-FFF2-40B4-BE49-F238E27FC236}">
+                    <a16:creationId xmlns:a16="http://schemas.microsoft.com/office/drawing/2014/main" id="{C9627B49-E75A-6623-CE34-52E4C0A02626}"/>
+                  </a:ext>
+                </a:extLst>
+              </p:cNvPr>
+              <p:cNvSpPr txBox="1">
+                <a:spLocks noRot="1" noChangeAspect="1" noMove="1" noResize="1" noEditPoints="1" noAdjustHandles="1" noChangeArrowheads="1" noChangeShapeType="1" noTextEdit="1"/>
+              </p:cNvSpPr>
+              <p:nvPr/>
+            </p:nvSpPr>
+            <p:spPr>
+              <a:xfrm>
+                <a:off x="6567248" y="4378574"/>
+                <a:ext cx="506934" cy="338554"/>
+              </a:xfrm>
+              <a:prstGeom prst="rect">
+                <a:avLst/>
+              </a:prstGeom>
+              <a:blipFill>
+                <a:blip r:embed="rId11"/>
+                <a:stretch>
+                  <a:fillRect/>
+                </a:stretch>
+              </a:blipFill>
+            </p:spPr>
+            <p:txBody>
+              <a:bodyPr/>
+              <a:lstStyle/>
+              <a:p>
+                <a:r>
+                  <a:rPr lang="zh-CN" altLang="en-US">
+                    <a:noFill/>
+                  </a:rPr>
+                  <a:t> </a:t>
+                </a:r>
+              </a:p>
+            </p:txBody>
+          </p:sp>
+        </mc:Fallback>
+      </mc:AlternateContent>
+      <p:cxnSp>
+        <p:nvCxnSpPr>
+          <p:cNvPr id="71" name="直线箭头连接符 70">
+            <a:extLst>
+              <a:ext uri="{FF2B5EF4-FFF2-40B4-BE49-F238E27FC236}">
+                <a16:creationId xmlns:a16="http://schemas.microsoft.com/office/drawing/2014/main" id="{161599EB-CEFE-3B8C-D6A7-8691B367AB11}"/>
+              </a:ext>
+            </a:extLst>
+          </p:cNvPr>
+          <p:cNvCxnSpPr>
+            <a:cxnSpLocks/>
+          </p:cNvCxnSpPr>
+          <p:nvPr/>
+        </p:nvCxnSpPr>
+        <p:spPr>
+          <a:xfrm>
+            <a:off x="5380727" y="1224772"/>
+            <a:ext cx="0" cy="1170696"/>
+          </a:xfrm>
+          <a:prstGeom prst="straightConnector1">
+            <a:avLst/>
+          </a:prstGeom>
+          <a:ln w="19050" cap="rnd">
+            <a:solidFill>
+              <a:schemeClr val="bg1">
+                <a:lumMod val="65000"/>
+                <a:alpha val="90000"/>
+              </a:schemeClr>
+            </a:solidFill>
+            <a:prstDash val="solid"/>
+            <a:headEnd type="none"/>
+            <a:tailEnd type="none" w="med" len="med"/>
+          </a:ln>
+        </p:spPr>
+        <p:style>
+          <a:lnRef idx="1">
+            <a:schemeClr val="accent1"/>
+          </a:lnRef>
+          <a:fillRef idx="0">
+            <a:schemeClr val="accent1"/>
+          </a:fillRef>
+          <a:effectRef idx="0">
+            <a:schemeClr val="accent1"/>
+          </a:effectRef>
+          <a:fontRef idx="minor">
+            <a:schemeClr val="tx1"/>
+          </a:fontRef>
+        </p:style>
+      </p:cxnSp>
+      <p:cxnSp>
+        <p:nvCxnSpPr>
+          <p:cNvPr id="73" name="直线箭头连接符 72">
+            <a:extLst>
+              <a:ext uri="{FF2B5EF4-FFF2-40B4-BE49-F238E27FC236}">
+                <a16:creationId xmlns:a16="http://schemas.microsoft.com/office/drawing/2014/main" id="{0D6DCBB4-4ED5-C18B-A797-1B2FD478CCF6}"/>
+              </a:ext>
+            </a:extLst>
+          </p:cNvPr>
+          <p:cNvCxnSpPr>
+            <a:cxnSpLocks/>
+          </p:cNvCxnSpPr>
+          <p:nvPr/>
+        </p:nvCxnSpPr>
+        <p:spPr>
+          <a:xfrm>
+            <a:off x="5308727" y="1304296"/>
+            <a:ext cx="0" cy="1143139"/>
+          </a:xfrm>
+          <a:prstGeom prst="straightConnector1">
+            <a:avLst/>
+          </a:prstGeom>
+          <a:ln w="19050" cap="rnd">
+            <a:solidFill>
+              <a:schemeClr val="bg1">
+                <a:lumMod val="65000"/>
+                <a:alpha val="90000"/>
+              </a:schemeClr>
+            </a:solidFill>
+            <a:prstDash val="solid"/>
+            <a:headEnd type="none"/>
+            <a:tailEnd type="none" w="med" len="med"/>
+          </a:ln>
+        </p:spPr>
+        <p:style>
+          <a:lnRef idx="1">
+            <a:schemeClr val="accent1"/>
+          </a:lnRef>
+          <a:fillRef idx="0">
+            <a:schemeClr val="accent1"/>
+          </a:fillRef>
+          <a:effectRef idx="0">
+            <a:schemeClr val="accent1"/>
+          </a:effectRef>
+          <a:fontRef idx="minor">
+            <a:schemeClr val="tx1"/>
+          </a:fontRef>
+        </p:style>
+      </p:cxnSp>
+      <p:cxnSp>
+        <p:nvCxnSpPr>
+          <p:cNvPr id="77" name="直线箭头连接符 76">
+            <a:extLst>
+              <a:ext uri="{FF2B5EF4-FFF2-40B4-BE49-F238E27FC236}">
+                <a16:creationId xmlns:a16="http://schemas.microsoft.com/office/drawing/2014/main" id="{61F2480D-D99A-4AFA-7F36-DBFA429E0D0E}"/>
+              </a:ext>
+            </a:extLst>
+          </p:cNvPr>
+          <p:cNvCxnSpPr>
+            <a:cxnSpLocks/>
+          </p:cNvCxnSpPr>
+          <p:nvPr/>
+        </p:nvCxnSpPr>
+        <p:spPr>
+          <a:xfrm flipH="1">
+            <a:off x="5306813" y="1361344"/>
+            <a:ext cx="72416" cy="75041"/>
+          </a:xfrm>
+          <a:prstGeom prst="straightConnector1">
+            <a:avLst/>
+          </a:prstGeom>
+          <a:ln w="19050" cap="rnd">
+            <a:solidFill>
+              <a:schemeClr val="bg1">
+                <a:lumMod val="65000"/>
+                <a:alpha val="90000"/>
+              </a:schemeClr>
+            </a:solidFill>
+            <a:prstDash val="solid"/>
+            <a:headEnd type="none"/>
+            <a:tailEnd type="none" w="med" len="med"/>
+          </a:ln>
+        </p:spPr>
+        <p:style>
+          <a:lnRef idx="1">
+            <a:schemeClr val="accent1"/>
+          </a:lnRef>
+          <a:fillRef idx="0">
+            <a:schemeClr val="accent1"/>
+          </a:fillRef>
+          <a:effectRef idx="0">
+            <a:schemeClr val="accent1"/>
+          </a:effectRef>
+          <a:fontRef idx="minor">
+            <a:schemeClr val="tx1"/>
+          </a:fontRef>
+        </p:style>
+      </p:cxnSp>
+      <p:cxnSp>
+        <p:nvCxnSpPr>
+          <p:cNvPr id="82" name="直线箭头连接符 81">
+            <a:extLst>
+              <a:ext uri="{FF2B5EF4-FFF2-40B4-BE49-F238E27FC236}">
+                <a16:creationId xmlns:a16="http://schemas.microsoft.com/office/drawing/2014/main" id="{26063281-A00B-5EE7-9CDB-99AC601928F4}"/>
+              </a:ext>
+            </a:extLst>
+          </p:cNvPr>
+          <p:cNvCxnSpPr>
+            <a:cxnSpLocks/>
+          </p:cNvCxnSpPr>
+          <p:nvPr/>
+        </p:nvCxnSpPr>
+        <p:spPr>
+          <a:xfrm flipH="1">
+            <a:off x="5306813" y="1489391"/>
+            <a:ext cx="72416" cy="75041"/>
+          </a:xfrm>
+          <a:prstGeom prst="straightConnector1">
+            <a:avLst/>
+          </a:prstGeom>
+          <a:ln w="19050" cap="rnd">
+            <a:solidFill>
+              <a:schemeClr val="bg1">
+                <a:lumMod val="65000"/>
+                <a:alpha val="90000"/>
+              </a:schemeClr>
+            </a:solidFill>
+            <a:prstDash val="solid"/>
+            <a:headEnd type="none"/>
+            <a:tailEnd type="none" w="med" len="med"/>
+          </a:ln>
+        </p:spPr>
+        <p:style>
+          <a:lnRef idx="1">
+            <a:schemeClr val="accent1"/>
+          </a:lnRef>
+          <a:fillRef idx="0">
+            <a:schemeClr val="accent1"/>
+          </a:fillRef>
+          <a:effectRef idx="0">
+            <a:schemeClr val="accent1"/>
+          </a:effectRef>
+          <a:fontRef idx="minor">
+            <a:schemeClr val="tx1"/>
+          </a:fontRef>
+        </p:style>
+      </p:cxnSp>
+      <p:cxnSp>
+        <p:nvCxnSpPr>
+          <p:cNvPr id="22" name="直线箭头连接符 21">
+            <a:extLst>
+              <a:ext uri="{FF2B5EF4-FFF2-40B4-BE49-F238E27FC236}">
+                <a16:creationId xmlns:a16="http://schemas.microsoft.com/office/drawing/2014/main" id="{61AAF773-37B6-E71F-5BF6-8B4C994A4EF8}"/>
+              </a:ext>
+            </a:extLst>
+          </p:cNvPr>
+          <p:cNvCxnSpPr>
+            <a:cxnSpLocks/>
+          </p:cNvCxnSpPr>
+          <p:nvPr/>
+        </p:nvCxnSpPr>
+        <p:spPr>
+          <a:xfrm>
+            <a:off x="4760727" y="1508265"/>
+            <a:ext cx="0" cy="3575377"/>
+          </a:xfrm>
+          <a:prstGeom prst="straightConnector1">
+            <a:avLst/>
+          </a:prstGeom>
+          <a:ln w="19050" cap="rnd">
+            <a:solidFill>
+              <a:schemeClr val="accent5">
+                <a:alpha val="90000"/>
+              </a:schemeClr>
+            </a:solidFill>
+            <a:prstDash val="lgDash"/>
+            <a:headEnd type="none"/>
+            <a:tailEnd type="arrow" w="med" len="med"/>
+          </a:ln>
+        </p:spPr>
+        <p:style>
+          <a:lnRef idx="1">
+            <a:schemeClr val="accent1"/>
+          </a:lnRef>
+          <a:fillRef idx="0">
+            <a:schemeClr val="accent1"/>
+          </a:fillRef>
+          <a:effectRef idx="0">
+            <a:schemeClr val="accent1"/>
+          </a:effectRef>
+          <a:fontRef idx="minor">
+            <a:schemeClr val="tx1"/>
+          </a:fontRef>
+        </p:style>
+      </p:cxnSp>
+      <p:cxnSp>
+        <p:nvCxnSpPr>
+          <p:cNvPr id="83" name="直线箭头连接符 82">
+            <a:extLst>
+              <a:ext uri="{FF2B5EF4-FFF2-40B4-BE49-F238E27FC236}">
+                <a16:creationId xmlns:a16="http://schemas.microsoft.com/office/drawing/2014/main" id="{F9290613-A587-F5D5-49DD-D97E32E05D43}"/>
+              </a:ext>
+            </a:extLst>
+          </p:cNvPr>
+          <p:cNvCxnSpPr>
+            <a:cxnSpLocks/>
+          </p:cNvCxnSpPr>
+          <p:nvPr/>
+        </p:nvCxnSpPr>
+        <p:spPr>
+          <a:xfrm flipH="1">
+            <a:off x="5306813" y="1617438"/>
+            <a:ext cx="72416" cy="75041"/>
+          </a:xfrm>
+          <a:prstGeom prst="straightConnector1">
+            <a:avLst/>
+          </a:prstGeom>
+          <a:ln w="19050" cap="rnd">
+            <a:solidFill>
+              <a:schemeClr val="bg1">
+                <a:lumMod val="65000"/>
+                <a:alpha val="90000"/>
+              </a:schemeClr>
+            </a:solidFill>
+            <a:prstDash val="solid"/>
+            <a:headEnd type="none"/>
+            <a:tailEnd type="none" w="med" len="med"/>
+          </a:ln>
+        </p:spPr>
+        <p:style>
+          <a:lnRef idx="1">
+            <a:schemeClr val="accent1"/>
+          </a:lnRef>
+          <a:fillRef idx="0">
+            <a:schemeClr val="accent1"/>
+          </a:fillRef>
+          <a:effectRef idx="0">
+            <a:schemeClr val="accent1"/>
+          </a:effectRef>
+          <a:fontRef idx="minor">
+            <a:schemeClr val="tx1"/>
+          </a:fontRef>
+        </p:style>
+      </p:cxnSp>
+      <p:cxnSp>
+        <p:nvCxnSpPr>
+          <p:cNvPr id="84" name="直线箭头连接符 83">
+            <a:extLst>
+              <a:ext uri="{FF2B5EF4-FFF2-40B4-BE49-F238E27FC236}">
+                <a16:creationId xmlns:a16="http://schemas.microsoft.com/office/drawing/2014/main" id="{C2B253C3-4430-9F0A-268C-694F5548B978}"/>
+              </a:ext>
+            </a:extLst>
+          </p:cNvPr>
+          <p:cNvCxnSpPr>
+            <a:cxnSpLocks/>
+          </p:cNvCxnSpPr>
+          <p:nvPr/>
+        </p:nvCxnSpPr>
+        <p:spPr>
+          <a:xfrm flipH="1">
+            <a:off x="5306813" y="1745485"/>
+            <a:ext cx="72416" cy="75041"/>
+          </a:xfrm>
+          <a:prstGeom prst="straightConnector1">
+            <a:avLst/>
+          </a:prstGeom>
+          <a:ln w="19050" cap="rnd">
+            <a:solidFill>
+              <a:schemeClr val="bg1">
+                <a:lumMod val="65000"/>
+                <a:alpha val="90000"/>
+              </a:schemeClr>
+            </a:solidFill>
+            <a:prstDash val="solid"/>
+            <a:headEnd type="none"/>
+            <a:tailEnd type="none" w="med" len="med"/>
+          </a:ln>
+        </p:spPr>
+        <p:style>
+          <a:lnRef idx="1">
+            <a:schemeClr val="accent1"/>
+          </a:lnRef>
+          <a:fillRef idx="0">
+            <a:schemeClr val="accent1"/>
+          </a:fillRef>
+          <a:effectRef idx="0">
+            <a:schemeClr val="accent1"/>
+          </a:effectRef>
+          <a:fontRef idx="minor">
+            <a:schemeClr val="tx1"/>
+          </a:fontRef>
+        </p:style>
+      </p:cxnSp>
+      <p:cxnSp>
+        <p:nvCxnSpPr>
+          <p:cNvPr id="85" name="直线箭头连接符 84">
+            <a:extLst>
+              <a:ext uri="{FF2B5EF4-FFF2-40B4-BE49-F238E27FC236}">
+                <a16:creationId xmlns:a16="http://schemas.microsoft.com/office/drawing/2014/main" id="{CA3076DA-8D83-EB69-AE40-860CA0BB3F64}"/>
+              </a:ext>
+            </a:extLst>
+          </p:cNvPr>
+          <p:cNvCxnSpPr>
+            <a:cxnSpLocks/>
+          </p:cNvCxnSpPr>
+          <p:nvPr/>
+        </p:nvCxnSpPr>
+        <p:spPr>
+          <a:xfrm flipH="1">
+            <a:off x="5306813" y="1873532"/>
+            <a:ext cx="72416" cy="75041"/>
+          </a:xfrm>
+          <a:prstGeom prst="straightConnector1">
+            <a:avLst/>
+          </a:prstGeom>
+          <a:ln w="19050" cap="rnd">
+            <a:solidFill>
+              <a:schemeClr val="bg1">
+                <a:lumMod val="65000"/>
+                <a:alpha val="90000"/>
+              </a:schemeClr>
+            </a:solidFill>
+            <a:prstDash val="solid"/>
+            <a:headEnd type="none"/>
+            <a:tailEnd type="none" w="med" len="med"/>
+          </a:ln>
+        </p:spPr>
+        <p:style>
+          <a:lnRef idx="1">
+            <a:schemeClr val="accent1"/>
+          </a:lnRef>
+          <a:fillRef idx="0">
+            <a:schemeClr val="accent1"/>
+          </a:fillRef>
+          <a:effectRef idx="0">
+            <a:schemeClr val="accent1"/>
+          </a:effectRef>
+          <a:fontRef idx="minor">
+            <a:schemeClr val="tx1"/>
+          </a:fontRef>
+        </p:style>
+      </p:cxnSp>
+      <p:cxnSp>
+        <p:nvCxnSpPr>
+          <p:cNvPr id="86" name="直线箭头连接符 85">
+            <a:extLst>
+              <a:ext uri="{FF2B5EF4-FFF2-40B4-BE49-F238E27FC236}">
+                <a16:creationId xmlns:a16="http://schemas.microsoft.com/office/drawing/2014/main" id="{34C77745-FE37-F332-A546-703AF9666C40}"/>
+              </a:ext>
+            </a:extLst>
+          </p:cNvPr>
+          <p:cNvCxnSpPr>
+            <a:cxnSpLocks/>
+          </p:cNvCxnSpPr>
+          <p:nvPr/>
+        </p:nvCxnSpPr>
+        <p:spPr>
+          <a:xfrm flipH="1">
+            <a:off x="5306813" y="2001579"/>
+            <a:ext cx="72416" cy="75041"/>
+          </a:xfrm>
+          <a:prstGeom prst="straightConnector1">
+            <a:avLst/>
+          </a:prstGeom>
+          <a:ln w="19050" cap="rnd">
+            <a:solidFill>
+              <a:schemeClr val="bg1">
+                <a:lumMod val="65000"/>
+                <a:alpha val="90000"/>
+              </a:schemeClr>
+            </a:solidFill>
+            <a:prstDash val="solid"/>
+            <a:headEnd type="none"/>
+            <a:tailEnd type="none" w="med" len="med"/>
+          </a:ln>
+        </p:spPr>
+        <p:style>
+          <a:lnRef idx="1">
+            <a:schemeClr val="accent1"/>
+          </a:lnRef>
+          <a:fillRef idx="0">
+            <a:schemeClr val="accent1"/>
+          </a:fillRef>
+          <a:effectRef idx="0">
+            <a:schemeClr val="accent1"/>
+          </a:effectRef>
+          <a:fontRef idx="minor">
+            <a:schemeClr val="tx1"/>
+          </a:fontRef>
+        </p:style>
+      </p:cxnSp>
+      <p:cxnSp>
+        <p:nvCxnSpPr>
+          <p:cNvPr id="87" name="直线箭头连接符 86">
+            <a:extLst>
+              <a:ext uri="{FF2B5EF4-FFF2-40B4-BE49-F238E27FC236}">
+                <a16:creationId xmlns:a16="http://schemas.microsoft.com/office/drawing/2014/main" id="{3E57FED5-18CE-D004-6294-14A0FF6AC219}"/>
+              </a:ext>
+            </a:extLst>
+          </p:cNvPr>
+          <p:cNvCxnSpPr>
+            <a:cxnSpLocks/>
+          </p:cNvCxnSpPr>
+          <p:nvPr/>
+        </p:nvCxnSpPr>
+        <p:spPr>
+          <a:xfrm flipH="1">
+            <a:off x="5306813" y="2129626"/>
+            <a:ext cx="72416" cy="75041"/>
+          </a:xfrm>
+          <a:prstGeom prst="straightConnector1">
+            <a:avLst/>
+          </a:prstGeom>
+          <a:ln w="19050" cap="rnd">
+            <a:solidFill>
+              <a:schemeClr val="bg1">
+                <a:lumMod val="65000"/>
+                <a:alpha val="90000"/>
+              </a:schemeClr>
+            </a:solidFill>
+            <a:prstDash val="solid"/>
+            <a:headEnd type="none"/>
+            <a:tailEnd type="none" w="med" len="med"/>
+          </a:ln>
+        </p:spPr>
+        <p:style>
+          <a:lnRef idx="1">
+            <a:schemeClr val="accent1"/>
+          </a:lnRef>
+          <a:fillRef idx="0">
+            <a:schemeClr val="accent1"/>
+          </a:fillRef>
+          <a:effectRef idx="0">
+            <a:schemeClr val="accent1"/>
+          </a:effectRef>
+          <a:fontRef idx="minor">
+            <a:schemeClr val="tx1"/>
+          </a:fontRef>
+        </p:style>
+      </p:cxnSp>
+      <p:cxnSp>
+        <p:nvCxnSpPr>
+          <p:cNvPr id="88" name="直线箭头连接符 87">
+            <a:extLst>
+              <a:ext uri="{FF2B5EF4-FFF2-40B4-BE49-F238E27FC236}">
+                <a16:creationId xmlns:a16="http://schemas.microsoft.com/office/drawing/2014/main" id="{0FA24E08-DEF8-F2B0-F721-03D9F53F5BEA}"/>
+              </a:ext>
+            </a:extLst>
+          </p:cNvPr>
+          <p:cNvCxnSpPr>
+            <a:cxnSpLocks/>
+          </p:cNvCxnSpPr>
+          <p:nvPr/>
+        </p:nvCxnSpPr>
+        <p:spPr>
+          <a:xfrm flipH="1">
+            <a:off x="5306813" y="2257673"/>
+            <a:ext cx="72416" cy="75041"/>
+          </a:xfrm>
+          <a:prstGeom prst="straightConnector1">
+            <a:avLst/>
+          </a:prstGeom>
+          <a:ln w="19050" cap="rnd">
+            <a:solidFill>
+              <a:schemeClr val="bg1">
+                <a:lumMod val="65000"/>
+                <a:alpha val="90000"/>
+              </a:schemeClr>
+            </a:solidFill>
+            <a:prstDash val="solid"/>
+            <a:headEnd type="none"/>
+            <a:tailEnd type="none" w="med" len="med"/>
+          </a:ln>
+        </p:spPr>
+        <p:style>
+          <a:lnRef idx="1">
+            <a:schemeClr val="accent1"/>
+          </a:lnRef>
+          <a:fillRef idx="0">
+            <a:schemeClr val="accent1"/>
+          </a:fillRef>
+          <a:effectRef idx="0">
+            <a:schemeClr val="accent1"/>
+          </a:effectRef>
+          <a:fontRef idx="minor">
+            <a:schemeClr val="tx1"/>
+          </a:fontRef>
+        </p:style>
+      </p:cxnSp>
+      <p:cxnSp>
+        <p:nvCxnSpPr>
+          <p:cNvPr id="89" name="直线箭头连接符 88">
+            <a:extLst>
+              <a:ext uri="{FF2B5EF4-FFF2-40B4-BE49-F238E27FC236}">
+                <a16:creationId xmlns:a16="http://schemas.microsoft.com/office/drawing/2014/main" id="{CB6557A0-BA3E-6633-B894-3381BA1F1DCE}"/>
+              </a:ext>
+            </a:extLst>
+          </p:cNvPr>
+          <p:cNvCxnSpPr>
+            <a:cxnSpLocks/>
+          </p:cNvCxnSpPr>
+          <p:nvPr/>
+        </p:nvCxnSpPr>
+        <p:spPr>
+          <a:xfrm flipH="1">
+            <a:off x="5306813" y="2385718"/>
+            <a:ext cx="72416" cy="75041"/>
+          </a:xfrm>
+          <a:prstGeom prst="straightConnector1">
+            <a:avLst/>
+          </a:prstGeom>
+          <a:ln w="19050" cap="rnd">
+            <a:solidFill>
+              <a:schemeClr val="bg1">
+                <a:lumMod val="65000"/>
+                <a:alpha val="90000"/>
+              </a:schemeClr>
+            </a:solidFill>
+            <a:prstDash val="solid"/>
+            <a:headEnd type="none"/>
+            <a:tailEnd type="none" w="med" len="med"/>
+          </a:ln>
+        </p:spPr>
+        <p:style>
+          <a:lnRef idx="1">
+            <a:schemeClr val="accent1"/>
+          </a:lnRef>
+          <a:fillRef idx="0">
+            <a:schemeClr val="accent1"/>
+          </a:fillRef>
+          <a:effectRef idx="0">
+            <a:schemeClr val="accent1"/>
+          </a:effectRef>
+          <a:fontRef idx="minor">
+            <a:schemeClr val="tx1"/>
+          </a:fontRef>
+        </p:style>
+      </p:cxnSp>
+      <p:cxnSp>
+        <p:nvCxnSpPr>
+          <p:cNvPr id="91" name="直线箭头连接符 90">
+            <a:extLst>
+              <a:ext uri="{FF2B5EF4-FFF2-40B4-BE49-F238E27FC236}">
+                <a16:creationId xmlns:a16="http://schemas.microsoft.com/office/drawing/2014/main" id="{98CB5DD7-F6EE-B204-CDEE-90FAF4383001}"/>
+              </a:ext>
+            </a:extLst>
+          </p:cNvPr>
+          <p:cNvCxnSpPr>
+            <a:cxnSpLocks/>
+          </p:cNvCxnSpPr>
+          <p:nvPr/>
+        </p:nvCxnSpPr>
+        <p:spPr>
+          <a:xfrm flipH="1">
+            <a:off x="5306813" y="1233297"/>
+            <a:ext cx="72416" cy="75041"/>
+          </a:xfrm>
+          <a:prstGeom prst="straightConnector1">
+            <a:avLst/>
+          </a:prstGeom>
+          <a:ln w="19050" cap="rnd">
+            <a:solidFill>
+              <a:schemeClr val="bg1">
+                <a:lumMod val="65000"/>
+                <a:alpha val="90000"/>
+              </a:schemeClr>
+            </a:solidFill>
+            <a:prstDash val="solid"/>
+            <a:headEnd type="none"/>
+            <a:tailEnd type="none" w="med" len="med"/>
+          </a:ln>
+        </p:spPr>
+        <p:style>
+          <a:lnRef idx="1">
+            <a:schemeClr val="accent1"/>
+          </a:lnRef>
+          <a:fillRef idx="0">
+            <a:schemeClr val="accent1"/>
+          </a:fillRef>
+          <a:effectRef idx="0">
+            <a:schemeClr val="accent1"/>
+          </a:effectRef>
+          <a:fontRef idx="minor">
+            <a:schemeClr val="tx1"/>
+          </a:fontRef>
+        </p:style>
+      </p:cxnSp>
+      <p:cxnSp>
+        <p:nvCxnSpPr>
+          <p:cNvPr id="92" name="直线箭头连接符 91">
+            <a:extLst>
+              <a:ext uri="{FF2B5EF4-FFF2-40B4-BE49-F238E27FC236}">
+                <a16:creationId xmlns:a16="http://schemas.microsoft.com/office/drawing/2014/main" id="{6600226A-2C8B-A3C8-3D02-9EEC2EB727C7}"/>
+              </a:ext>
+            </a:extLst>
+          </p:cNvPr>
+          <p:cNvCxnSpPr>
+            <a:cxnSpLocks/>
+          </p:cNvCxnSpPr>
+          <p:nvPr/>
+        </p:nvCxnSpPr>
+        <p:spPr>
+          <a:xfrm flipH="1">
+            <a:off x="4068362" y="2338369"/>
+            <a:ext cx="1234808" cy="1207569"/>
+          </a:xfrm>
+          <a:prstGeom prst="straightConnector1">
+            <a:avLst/>
+          </a:prstGeom>
+          <a:ln w="19050" cap="rnd">
+            <a:solidFill>
+              <a:schemeClr val="bg1">
+                <a:lumMod val="65000"/>
+                <a:alpha val="90000"/>
+              </a:schemeClr>
+            </a:solidFill>
+            <a:prstDash val="solid"/>
+            <a:headEnd type="none"/>
+            <a:tailEnd type="none" w="med" len="med"/>
+          </a:ln>
+        </p:spPr>
+        <p:style>
+          <a:lnRef idx="1">
+            <a:schemeClr val="accent1"/>
+          </a:lnRef>
+          <a:fillRef idx="0">
+            <a:schemeClr val="accent1"/>
+          </a:fillRef>
+          <a:effectRef idx="0">
+            <a:schemeClr val="accent1"/>
+          </a:effectRef>
+          <a:fontRef idx="minor">
+            <a:schemeClr val="tx1"/>
+          </a:fontRef>
+        </p:style>
+      </p:cxnSp>
+      <p:cxnSp>
+        <p:nvCxnSpPr>
+          <p:cNvPr id="98" name="直线箭头连接符 97">
+            <a:extLst>
+              <a:ext uri="{FF2B5EF4-FFF2-40B4-BE49-F238E27FC236}">
+                <a16:creationId xmlns:a16="http://schemas.microsoft.com/office/drawing/2014/main" id="{03319A83-C20F-079D-5AE7-C8BD5C312E14}"/>
+              </a:ext>
+            </a:extLst>
+          </p:cNvPr>
+          <p:cNvCxnSpPr>
+            <a:cxnSpLocks/>
+          </p:cNvCxnSpPr>
+          <p:nvPr/>
+        </p:nvCxnSpPr>
+        <p:spPr>
+          <a:xfrm flipH="1">
+            <a:off x="4060861" y="2461429"/>
+            <a:ext cx="1234808" cy="1207569"/>
+          </a:xfrm>
+          <a:prstGeom prst="straightConnector1">
+            <a:avLst/>
+          </a:prstGeom>
+          <a:ln w="19050" cap="rnd">
+            <a:solidFill>
+              <a:schemeClr val="bg1">
+                <a:lumMod val="65000"/>
+                <a:alpha val="90000"/>
+              </a:schemeClr>
+            </a:solidFill>
+            <a:prstDash val="solid"/>
+            <a:headEnd type="none"/>
+            <a:tailEnd type="none" w="med" len="med"/>
+          </a:ln>
+        </p:spPr>
+        <p:style>
+          <a:lnRef idx="1">
+            <a:schemeClr val="accent1"/>
+          </a:lnRef>
+          <a:fillRef idx="0">
+            <a:schemeClr val="accent1"/>
+          </a:fillRef>
+          <a:effectRef idx="0">
+            <a:schemeClr val="accent1"/>
+          </a:effectRef>
+          <a:fontRef idx="minor">
+            <a:schemeClr val="tx1"/>
+          </a:fontRef>
+        </p:style>
+      </p:cxnSp>
+      <p:cxnSp>
+        <p:nvCxnSpPr>
+          <p:cNvPr id="99" name="直线箭头连接符 98">
+            <a:extLst>
+              <a:ext uri="{FF2B5EF4-FFF2-40B4-BE49-F238E27FC236}">
+                <a16:creationId xmlns:a16="http://schemas.microsoft.com/office/drawing/2014/main" id="{0CD21DEA-2548-45F6-929A-893819F46877}"/>
+              </a:ext>
+            </a:extLst>
+          </p:cNvPr>
+          <p:cNvCxnSpPr>
+            <a:cxnSpLocks/>
+          </p:cNvCxnSpPr>
+          <p:nvPr/>
+        </p:nvCxnSpPr>
+        <p:spPr>
+          <a:xfrm flipV="1">
+            <a:off x="5208326" y="2431846"/>
+            <a:ext cx="0" cy="123021"/>
+          </a:xfrm>
+          <a:prstGeom prst="straightConnector1">
+            <a:avLst/>
+          </a:prstGeom>
+          <a:ln w="19050" cap="rnd">
+            <a:solidFill>
+              <a:schemeClr val="bg1">
+                <a:lumMod val="65000"/>
+                <a:alpha val="90000"/>
+              </a:schemeClr>
+            </a:solidFill>
+            <a:prstDash val="solid"/>
+            <a:headEnd type="none"/>
+            <a:tailEnd type="none" w="med" len="med"/>
+          </a:ln>
+        </p:spPr>
+        <p:style>
+          <a:lnRef idx="1">
+            <a:schemeClr val="accent1"/>
+          </a:lnRef>
+          <a:fillRef idx="0">
+            <a:schemeClr val="accent1"/>
+          </a:fillRef>
+          <a:effectRef idx="0">
+            <a:schemeClr val="accent1"/>
+          </a:effectRef>
+          <a:fontRef idx="minor">
+            <a:schemeClr val="tx1"/>
+          </a:fontRef>
+        </p:style>
+      </p:cxnSp>
+      <p:cxnSp>
+        <p:nvCxnSpPr>
+          <p:cNvPr id="102" name="直线箭头连接符 101">
+            <a:extLst>
+              <a:ext uri="{FF2B5EF4-FFF2-40B4-BE49-F238E27FC236}">
+                <a16:creationId xmlns:a16="http://schemas.microsoft.com/office/drawing/2014/main" id="{B6FBE38A-9286-8C17-739C-2CCA06760618}"/>
+              </a:ext>
+            </a:extLst>
+          </p:cNvPr>
+          <p:cNvCxnSpPr>
+            <a:cxnSpLocks/>
+          </p:cNvCxnSpPr>
+          <p:nvPr/>
+        </p:nvCxnSpPr>
+        <p:spPr>
+          <a:xfrm flipV="1">
+            <a:off x="5111933" y="2521374"/>
+            <a:ext cx="0" cy="123021"/>
+          </a:xfrm>
+          <a:prstGeom prst="straightConnector1">
+            <a:avLst/>
+          </a:prstGeom>
+          <a:ln w="19050" cap="rnd">
+            <a:solidFill>
+              <a:schemeClr val="bg1">
+                <a:lumMod val="65000"/>
+                <a:alpha val="90000"/>
+              </a:schemeClr>
+            </a:solidFill>
+            <a:prstDash val="solid"/>
+            <a:headEnd type="none"/>
+            <a:tailEnd type="none" w="med" len="med"/>
+          </a:ln>
+        </p:spPr>
+        <p:style>
+          <a:lnRef idx="1">
+            <a:schemeClr val="accent1"/>
+          </a:lnRef>
+          <a:fillRef idx="0">
+            <a:schemeClr val="accent1"/>
+          </a:fillRef>
+          <a:effectRef idx="0">
+            <a:schemeClr val="accent1"/>
+          </a:effectRef>
+          <a:fontRef idx="minor">
+            <a:schemeClr val="tx1"/>
+          </a:fontRef>
+        </p:style>
+      </p:cxnSp>
+      <p:cxnSp>
+        <p:nvCxnSpPr>
+          <p:cNvPr id="103" name="直线箭头连接符 102">
+            <a:extLst>
+              <a:ext uri="{FF2B5EF4-FFF2-40B4-BE49-F238E27FC236}">
+                <a16:creationId xmlns:a16="http://schemas.microsoft.com/office/drawing/2014/main" id="{89AC9D6D-F81F-4559-E468-ACB3F72A3920}"/>
+              </a:ext>
+            </a:extLst>
+          </p:cNvPr>
+          <p:cNvCxnSpPr>
+            <a:cxnSpLocks/>
+          </p:cNvCxnSpPr>
+          <p:nvPr/>
+        </p:nvCxnSpPr>
+        <p:spPr>
+          <a:xfrm flipV="1">
+            <a:off x="5015537" y="2619356"/>
+            <a:ext cx="0" cy="123021"/>
+          </a:xfrm>
+          <a:prstGeom prst="straightConnector1">
+            <a:avLst/>
+          </a:prstGeom>
+          <a:ln w="19050" cap="rnd">
+            <a:solidFill>
+              <a:schemeClr val="bg1">
+                <a:lumMod val="65000"/>
+                <a:alpha val="90000"/>
+              </a:schemeClr>
+            </a:solidFill>
+            <a:prstDash val="solid"/>
+            <a:headEnd type="none"/>
+            <a:tailEnd type="none" w="med" len="med"/>
+          </a:ln>
+        </p:spPr>
+        <p:style>
+          <a:lnRef idx="1">
+            <a:schemeClr val="accent1"/>
+          </a:lnRef>
+          <a:fillRef idx="0">
+            <a:schemeClr val="accent1"/>
+          </a:fillRef>
+          <a:effectRef idx="0">
+            <a:schemeClr val="accent1"/>
+          </a:effectRef>
+          <a:fontRef idx="minor">
+            <a:schemeClr val="tx1"/>
+          </a:fontRef>
+        </p:style>
+      </p:cxnSp>
+      <p:cxnSp>
+        <p:nvCxnSpPr>
+          <p:cNvPr id="104" name="直线箭头连接符 103">
+            <a:extLst>
+              <a:ext uri="{FF2B5EF4-FFF2-40B4-BE49-F238E27FC236}">
+                <a16:creationId xmlns:a16="http://schemas.microsoft.com/office/drawing/2014/main" id="{4A35F22E-C46E-DCB1-18C5-25E86C02745C}"/>
+              </a:ext>
+            </a:extLst>
+          </p:cNvPr>
+          <p:cNvCxnSpPr>
+            <a:cxnSpLocks/>
+          </p:cNvCxnSpPr>
+          <p:nvPr/>
+        </p:nvCxnSpPr>
+        <p:spPr>
+          <a:xfrm flipV="1">
+            <a:off x="4919141" y="2719167"/>
+            <a:ext cx="0" cy="123021"/>
+          </a:xfrm>
+          <a:prstGeom prst="straightConnector1">
+            <a:avLst/>
+          </a:prstGeom>
+          <a:ln w="19050" cap="rnd">
+            <a:solidFill>
+              <a:schemeClr val="bg1">
+                <a:lumMod val="65000"/>
+                <a:alpha val="90000"/>
+              </a:schemeClr>
+            </a:solidFill>
+            <a:prstDash val="solid"/>
+            <a:headEnd type="none"/>
+            <a:tailEnd type="none" w="med" len="med"/>
+          </a:ln>
+        </p:spPr>
+        <p:style>
+          <a:lnRef idx="1">
+            <a:schemeClr val="accent1"/>
+          </a:lnRef>
+          <a:fillRef idx="0">
+            <a:schemeClr val="accent1"/>
+          </a:fillRef>
+          <a:effectRef idx="0">
+            <a:schemeClr val="accent1"/>
+          </a:effectRef>
+          <a:fontRef idx="minor">
+            <a:schemeClr val="tx1"/>
+          </a:fontRef>
+        </p:style>
+      </p:cxnSp>
+      <p:cxnSp>
+        <p:nvCxnSpPr>
+          <p:cNvPr id="105" name="直线箭头连接符 104">
+            <a:extLst>
+              <a:ext uri="{FF2B5EF4-FFF2-40B4-BE49-F238E27FC236}">
+                <a16:creationId xmlns:a16="http://schemas.microsoft.com/office/drawing/2014/main" id="{14F5D2C1-B622-7FE0-A187-1374828643B4}"/>
+              </a:ext>
+            </a:extLst>
+          </p:cNvPr>
+          <p:cNvCxnSpPr>
+            <a:cxnSpLocks/>
+          </p:cNvCxnSpPr>
+          <p:nvPr/>
+        </p:nvCxnSpPr>
+        <p:spPr>
+          <a:xfrm flipV="1">
+            <a:off x="4822745" y="2809848"/>
+            <a:ext cx="0" cy="123021"/>
+          </a:xfrm>
+          <a:prstGeom prst="straightConnector1">
+            <a:avLst/>
+          </a:prstGeom>
+          <a:ln w="19050" cap="rnd">
+            <a:solidFill>
+              <a:schemeClr val="bg1">
+                <a:lumMod val="65000"/>
+                <a:alpha val="90000"/>
+              </a:schemeClr>
+            </a:solidFill>
+            <a:prstDash val="solid"/>
+            <a:headEnd type="none"/>
+            <a:tailEnd type="none" w="med" len="med"/>
+          </a:ln>
+        </p:spPr>
+        <p:style>
+          <a:lnRef idx="1">
+            <a:schemeClr val="accent1"/>
+          </a:lnRef>
+          <a:fillRef idx="0">
+            <a:schemeClr val="accent1"/>
+          </a:fillRef>
+          <a:effectRef idx="0">
+            <a:schemeClr val="accent1"/>
+          </a:effectRef>
+          <a:fontRef idx="minor">
+            <a:schemeClr val="tx1"/>
+          </a:fontRef>
+        </p:style>
+      </p:cxnSp>
+      <p:cxnSp>
+        <p:nvCxnSpPr>
+          <p:cNvPr id="106" name="直线箭头连接符 105">
+            <a:extLst>
+              <a:ext uri="{FF2B5EF4-FFF2-40B4-BE49-F238E27FC236}">
+                <a16:creationId xmlns:a16="http://schemas.microsoft.com/office/drawing/2014/main" id="{BAB17252-AEF5-FCD0-17D5-949D15AD2AD3}"/>
+              </a:ext>
+            </a:extLst>
+          </p:cNvPr>
+          <p:cNvCxnSpPr>
+            <a:cxnSpLocks/>
+          </p:cNvCxnSpPr>
+          <p:nvPr/>
+        </p:nvCxnSpPr>
+        <p:spPr>
+          <a:xfrm flipV="1">
+            <a:off x="4726349" y="2905133"/>
+            <a:ext cx="0" cy="123021"/>
+          </a:xfrm>
+          <a:prstGeom prst="straightConnector1">
+            <a:avLst/>
+          </a:prstGeom>
+          <a:ln w="19050" cap="rnd">
+            <a:solidFill>
+              <a:schemeClr val="bg1">
+                <a:lumMod val="65000"/>
+                <a:alpha val="90000"/>
+              </a:schemeClr>
+            </a:solidFill>
+            <a:prstDash val="solid"/>
+            <a:headEnd type="none"/>
+            <a:tailEnd type="none" w="med" len="med"/>
+          </a:ln>
+        </p:spPr>
+        <p:style>
+          <a:lnRef idx="1">
+            <a:schemeClr val="accent1"/>
+          </a:lnRef>
+          <a:fillRef idx="0">
+            <a:schemeClr val="accent1"/>
+          </a:fillRef>
+          <a:effectRef idx="0">
+            <a:schemeClr val="accent1"/>
+          </a:effectRef>
+          <a:fontRef idx="minor">
+            <a:schemeClr val="tx1"/>
+          </a:fontRef>
+        </p:style>
+      </p:cxnSp>
+      <p:cxnSp>
+        <p:nvCxnSpPr>
+          <p:cNvPr id="107" name="直线箭头连接符 106">
+            <a:extLst>
+              <a:ext uri="{FF2B5EF4-FFF2-40B4-BE49-F238E27FC236}">
+                <a16:creationId xmlns:a16="http://schemas.microsoft.com/office/drawing/2014/main" id="{8B1B0E32-816B-78A0-4828-4424A4F53700}"/>
+              </a:ext>
+            </a:extLst>
+          </p:cNvPr>
+          <p:cNvCxnSpPr>
+            <a:cxnSpLocks/>
+          </p:cNvCxnSpPr>
+          <p:nvPr/>
+        </p:nvCxnSpPr>
+        <p:spPr>
+          <a:xfrm flipV="1">
+            <a:off x="4629953" y="3003702"/>
+            <a:ext cx="0" cy="123021"/>
+          </a:xfrm>
+          <a:prstGeom prst="straightConnector1">
+            <a:avLst/>
+          </a:prstGeom>
+          <a:ln w="19050" cap="rnd">
+            <a:solidFill>
+              <a:schemeClr val="bg1">
+                <a:lumMod val="65000"/>
+                <a:alpha val="90000"/>
+              </a:schemeClr>
+            </a:solidFill>
+            <a:prstDash val="solid"/>
+            <a:headEnd type="none"/>
+            <a:tailEnd type="none" w="med" len="med"/>
+          </a:ln>
+        </p:spPr>
+        <p:style>
+          <a:lnRef idx="1">
+            <a:schemeClr val="accent1"/>
+          </a:lnRef>
+          <a:fillRef idx="0">
+            <a:schemeClr val="accent1"/>
+          </a:fillRef>
+          <a:effectRef idx="0">
+            <a:schemeClr val="accent1"/>
+          </a:effectRef>
+          <a:fontRef idx="minor">
+            <a:schemeClr val="tx1"/>
+          </a:fontRef>
+        </p:style>
+      </p:cxnSp>
+      <p:cxnSp>
+        <p:nvCxnSpPr>
+          <p:cNvPr id="108" name="直线箭头连接符 107">
+            <a:extLst>
+              <a:ext uri="{FF2B5EF4-FFF2-40B4-BE49-F238E27FC236}">
+                <a16:creationId xmlns:a16="http://schemas.microsoft.com/office/drawing/2014/main" id="{26855CD0-8B09-BBFF-22DE-BD96238767F6}"/>
+              </a:ext>
+            </a:extLst>
+          </p:cNvPr>
+          <p:cNvCxnSpPr>
+            <a:cxnSpLocks/>
+          </p:cNvCxnSpPr>
+          <p:nvPr/>
+        </p:nvCxnSpPr>
+        <p:spPr>
+          <a:xfrm flipV="1">
+            <a:off x="4533557" y="3092304"/>
+            <a:ext cx="0" cy="123021"/>
+          </a:xfrm>
+          <a:prstGeom prst="straightConnector1">
+            <a:avLst/>
+          </a:prstGeom>
+          <a:ln w="19050" cap="rnd">
+            <a:solidFill>
+              <a:schemeClr val="bg1">
+                <a:lumMod val="65000"/>
+                <a:alpha val="90000"/>
+              </a:schemeClr>
+            </a:solidFill>
+            <a:prstDash val="solid"/>
+            <a:headEnd type="none"/>
+            <a:tailEnd type="none" w="med" len="med"/>
+          </a:ln>
+        </p:spPr>
+        <p:style>
+          <a:lnRef idx="1">
+            <a:schemeClr val="accent1"/>
+          </a:lnRef>
+          <a:fillRef idx="0">
+            <a:schemeClr val="accent1"/>
+          </a:fillRef>
+          <a:effectRef idx="0">
+            <a:schemeClr val="accent1"/>
+          </a:effectRef>
+          <a:fontRef idx="minor">
+            <a:schemeClr val="tx1"/>
+          </a:fontRef>
+        </p:style>
+      </p:cxnSp>
+      <p:cxnSp>
+        <p:nvCxnSpPr>
+          <p:cNvPr id="109" name="直线箭头连接符 108">
+            <a:extLst>
+              <a:ext uri="{FF2B5EF4-FFF2-40B4-BE49-F238E27FC236}">
+                <a16:creationId xmlns:a16="http://schemas.microsoft.com/office/drawing/2014/main" id="{54B9E2F1-132F-20EF-4425-2D36E595BA55}"/>
+              </a:ext>
+            </a:extLst>
+          </p:cNvPr>
+          <p:cNvCxnSpPr>
+            <a:cxnSpLocks/>
+          </p:cNvCxnSpPr>
+          <p:nvPr/>
+        </p:nvCxnSpPr>
+        <p:spPr>
+          <a:xfrm flipV="1">
+            <a:off x="4437161" y="3182216"/>
+            <a:ext cx="0" cy="123021"/>
+          </a:xfrm>
+          <a:prstGeom prst="straightConnector1">
+            <a:avLst/>
+          </a:prstGeom>
+          <a:ln w="19050" cap="rnd">
+            <a:solidFill>
+              <a:schemeClr val="bg1">
+                <a:lumMod val="65000"/>
+                <a:alpha val="90000"/>
+              </a:schemeClr>
+            </a:solidFill>
+            <a:prstDash val="solid"/>
+            <a:headEnd type="none"/>
+            <a:tailEnd type="none" w="med" len="med"/>
+          </a:ln>
+        </p:spPr>
+        <p:style>
+          <a:lnRef idx="1">
+            <a:schemeClr val="accent1"/>
+          </a:lnRef>
+          <a:fillRef idx="0">
+            <a:schemeClr val="accent1"/>
+          </a:fillRef>
+          <a:effectRef idx="0">
+            <a:schemeClr val="accent1"/>
+          </a:effectRef>
+          <a:fontRef idx="minor">
+            <a:schemeClr val="tx1"/>
+          </a:fontRef>
+        </p:style>
+      </p:cxnSp>
+      <p:cxnSp>
+        <p:nvCxnSpPr>
+          <p:cNvPr id="110" name="直线箭头连接符 109">
+            <a:extLst>
+              <a:ext uri="{FF2B5EF4-FFF2-40B4-BE49-F238E27FC236}">
+                <a16:creationId xmlns:a16="http://schemas.microsoft.com/office/drawing/2014/main" id="{B831B112-EC04-4B13-4BCC-4978CCF8EF02}"/>
+              </a:ext>
+            </a:extLst>
+          </p:cNvPr>
+          <p:cNvCxnSpPr>
+            <a:cxnSpLocks/>
+          </p:cNvCxnSpPr>
+          <p:nvPr/>
+        </p:nvCxnSpPr>
+        <p:spPr>
+          <a:xfrm flipV="1">
+            <a:off x="4340765" y="3276435"/>
+            <a:ext cx="0" cy="123021"/>
+          </a:xfrm>
+          <a:prstGeom prst="straightConnector1">
+            <a:avLst/>
+          </a:prstGeom>
+          <a:ln w="19050" cap="rnd">
+            <a:solidFill>
+              <a:schemeClr val="bg1">
+                <a:lumMod val="65000"/>
+                <a:alpha val="90000"/>
+              </a:schemeClr>
+            </a:solidFill>
+            <a:prstDash val="solid"/>
+            <a:headEnd type="none"/>
+            <a:tailEnd type="none" w="med" len="med"/>
+          </a:ln>
+        </p:spPr>
+        <p:style>
+          <a:lnRef idx="1">
+            <a:schemeClr val="accent1"/>
+          </a:lnRef>
+          <a:fillRef idx="0">
+            <a:schemeClr val="accent1"/>
+          </a:fillRef>
+          <a:effectRef idx="0">
+            <a:schemeClr val="accent1"/>
+          </a:effectRef>
+          <a:fontRef idx="minor">
+            <a:schemeClr val="tx1"/>
+          </a:fontRef>
+        </p:style>
+      </p:cxnSp>
+      <p:cxnSp>
+        <p:nvCxnSpPr>
+          <p:cNvPr id="111" name="直线箭头连接符 110">
+            <a:extLst>
+              <a:ext uri="{FF2B5EF4-FFF2-40B4-BE49-F238E27FC236}">
+                <a16:creationId xmlns:a16="http://schemas.microsoft.com/office/drawing/2014/main" id="{984CAFD0-8C47-D3E9-0976-6F4AFED33B26}"/>
+              </a:ext>
+            </a:extLst>
+          </p:cNvPr>
+          <p:cNvCxnSpPr>
+            <a:cxnSpLocks/>
+          </p:cNvCxnSpPr>
+          <p:nvPr/>
+        </p:nvCxnSpPr>
+        <p:spPr>
+          <a:xfrm flipV="1">
+            <a:off x="4244369" y="3367489"/>
+            <a:ext cx="0" cy="123021"/>
+          </a:xfrm>
+          <a:prstGeom prst="straightConnector1">
+            <a:avLst/>
+          </a:prstGeom>
+          <a:ln w="19050" cap="rnd">
+            <a:solidFill>
+              <a:schemeClr val="bg1">
+                <a:lumMod val="65000"/>
+                <a:alpha val="90000"/>
+              </a:schemeClr>
+            </a:solidFill>
+            <a:prstDash val="solid"/>
+            <a:headEnd type="none"/>
+            <a:tailEnd type="none" w="med" len="med"/>
+          </a:ln>
+        </p:spPr>
+        <p:style>
+          <a:lnRef idx="1">
+            <a:schemeClr val="accent1"/>
+          </a:lnRef>
+          <a:fillRef idx="0">
+            <a:schemeClr val="accent1"/>
+          </a:fillRef>
+          <a:effectRef idx="0">
+            <a:schemeClr val="accent1"/>
+          </a:effectRef>
+          <a:fontRef idx="minor">
+            <a:schemeClr val="tx1"/>
+          </a:fontRef>
+        </p:style>
+      </p:cxnSp>
+      <p:cxnSp>
+        <p:nvCxnSpPr>
+          <p:cNvPr id="112" name="直线箭头连接符 111">
+            <a:extLst>
+              <a:ext uri="{FF2B5EF4-FFF2-40B4-BE49-F238E27FC236}">
+                <a16:creationId xmlns:a16="http://schemas.microsoft.com/office/drawing/2014/main" id="{7A4E428B-E982-7151-2DDE-B2473DDE117B}"/>
+              </a:ext>
+            </a:extLst>
+          </p:cNvPr>
+          <p:cNvCxnSpPr>
+            <a:cxnSpLocks/>
+          </p:cNvCxnSpPr>
+          <p:nvPr/>
+        </p:nvCxnSpPr>
+        <p:spPr>
+          <a:xfrm flipV="1">
+            <a:off x="4147973" y="3468442"/>
+            <a:ext cx="0" cy="123021"/>
+          </a:xfrm>
+          <a:prstGeom prst="straightConnector1">
+            <a:avLst/>
+          </a:prstGeom>
+          <a:ln w="19050" cap="rnd">
+            <a:solidFill>
+              <a:schemeClr val="bg1">
+                <a:lumMod val="65000"/>
+                <a:alpha val="90000"/>
+              </a:schemeClr>
+            </a:solidFill>
+            <a:prstDash val="solid"/>
+            <a:headEnd type="none"/>
+            <a:tailEnd type="none" w="med" len="med"/>
+          </a:ln>
+        </p:spPr>
+        <p:style>
+          <a:lnRef idx="1">
+            <a:schemeClr val="accent1"/>
+          </a:lnRef>
+          <a:fillRef idx="0">
+            <a:schemeClr val="accent1"/>
+          </a:fillRef>
+          <a:effectRef idx="0">
+            <a:schemeClr val="accent1"/>
+          </a:effectRef>
+          <a:fontRef idx="minor">
+            <a:schemeClr val="tx1"/>
+          </a:fontRef>
+        </p:style>
+      </p:cxnSp>
+      <p:cxnSp>
+        <p:nvCxnSpPr>
+          <p:cNvPr id="113" name="直线箭头连接符 112">
+            <a:extLst>
+              <a:ext uri="{FF2B5EF4-FFF2-40B4-BE49-F238E27FC236}">
+                <a16:creationId xmlns:a16="http://schemas.microsoft.com/office/drawing/2014/main" id="{B57D0180-60FB-7574-D83E-340C056C6A99}"/>
+              </a:ext>
+            </a:extLst>
+          </p:cNvPr>
+          <p:cNvCxnSpPr>
+            <a:cxnSpLocks/>
+          </p:cNvCxnSpPr>
+          <p:nvPr/>
+        </p:nvCxnSpPr>
+        <p:spPr>
+          <a:xfrm flipV="1">
+            <a:off x="4051577" y="3545977"/>
+            <a:ext cx="0" cy="123021"/>
+          </a:xfrm>
+          <a:prstGeom prst="straightConnector1">
+            <a:avLst/>
+          </a:prstGeom>
+          <a:ln w="19050" cap="rnd">
+            <a:solidFill>
+              <a:schemeClr val="bg1">
+                <a:lumMod val="65000"/>
+                <a:alpha val="90000"/>
+              </a:schemeClr>
+            </a:solidFill>
+            <a:prstDash val="solid"/>
+            <a:headEnd type="none"/>
+            <a:tailEnd type="none" w="med" len="med"/>
+          </a:ln>
+        </p:spPr>
+        <p:style>
+          <a:lnRef idx="1">
+            <a:schemeClr val="accent1"/>
+          </a:lnRef>
+          <a:fillRef idx="0">
+            <a:schemeClr val="accent1"/>
+          </a:fillRef>
+          <a:effectRef idx="0">
+            <a:schemeClr val="accent1"/>
+          </a:effectRef>
+          <a:fontRef idx="minor">
+            <a:schemeClr val="tx1"/>
+          </a:fontRef>
+        </p:style>
+      </p:cxnSp>
+      <p:sp>
+        <p:nvSpPr>
+          <p:cNvPr id="115" name="文本框 114">
+            <a:extLst>
+              <a:ext uri="{FF2B5EF4-FFF2-40B4-BE49-F238E27FC236}">
+                <a16:creationId xmlns:a16="http://schemas.microsoft.com/office/drawing/2014/main" id="{9D48342E-D681-DB01-4A80-C2223EDB8DEC}"/>
+              </a:ext>
+            </a:extLst>
+          </p:cNvPr>
+          <p:cNvSpPr txBox="1"/>
+          <p:nvPr/>
+        </p:nvSpPr>
+        <p:spPr>
+          <a:xfrm>
+            <a:off x="2496821" y="3006053"/>
+            <a:ext cx="1271502" cy="369332"/>
+          </a:xfrm>
+          <a:prstGeom prst="rect">
+            <a:avLst/>
+          </a:prstGeom>
+          <a:noFill/>
+        </p:spPr>
+        <p:txBody>
+          <a:bodyPr wrap="none" rtlCol="0">
+            <a:spAutoFit/>
+          </a:bodyPr>
+          <a:lstStyle/>
+          <a:p>
+            <a:r>
+              <a:rPr kumimoji="1" lang="en-US" altLang="zh-CN" dirty="0"/>
+              <a:t>optical</a:t>
+            </a:r>
+            <a:r>
+              <a:rPr kumimoji="1" lang="zh-CN" altLang="en-US" dirty="0"/>
+              <a:t> </a:t>
+            </a:r>
+            <a:r>
+              <a:rPr kumimoji="1" lang="en-US" altLang="zh-CN" dirty="0"/>
+              <a:t>axis</a:t>
+            </a:r>
+            <a:endParaRPr kumimoji="1" lang="zh-CN" altLang="en-US" dirty="0"/>
+          </a:p>
+        </p:txBody>
+      </p:sp>
+      <p:sp>
+        <p:nvSpPr>
+          <p:cNvPr id="117" name="任意形状 116">
+            <a:extLst>
+              <a:ext uri="{FF2B5EF4-FFF2-40B4-BE49-F238E27FC236}">
+                <a16:creationId xmlns:a16="http://schemas.microsoft.com/office/drawing/2014/main" id="{31BACFE2-EE93-15A9-0CA2-A7A3CD57A36F}"/>
+              </a:ext>
+            </a:extLst>
+          </p:cNvPr>
+          <p:cNvSpPr/>
+          <p:nvPr/>
+        </p:nvSpPr>
+        <p:spPr>
+          <a:xfrm>
+            <a:off x="3113590" y="2476982"/>
+            <a:ext cx="462987" cy="601884"/>
+          </a:xfrm>
+          <a:custGeom>
+            <a:avLst/>
+            <a:gdLst>
+              <a:gd name="connsiteX0" fmla="*/ 462987 w 462987"/>
+              <a:gd name="connsiteY0" fmla="*/ 0 h 601884"/>
+              <a:gd name="connsiteX1" fmla="*/ 104172 w 462987"/>
+              <a:gd name="connsiteY1" fmla="*/ 138896 h 601884"/>
+              <a:gd name="connsiteX2" fmla="*/ 0 w 462987"/>
+              <a:gd name="connsiteY2" fmla="*/ 601884 h 601884"/>
+            </a:gdLst>
+            <a:ahLst/>
+            <a:cxnLst>
+              <a:cxn ang="0">
+                <a:pos x="connsiteX0" y="connsiteY0"/>
+              </a:cxn>
+              <a:cxn ang="0">
+                <a:pos x="connsiteX1" y="connsiteY1"/>
+              </a:cxn>
+              <a:cxn ang="0">
+                <a:pos x="connsiteX2" y="connsiteY2"/>
+              </a:cxn>
+            </a:cxnLst>
+            <a:rect l="l" t="t" r="r" b="b"/>
+            <a:pathLst>
+              <a:path w="462987" h="601884">
+                <a:moveTo>
+                  <a:pt x="462987" y="0"/>
+                </a:moveTo>
+                <a:cubicBezTo>
+                  <a:pt x="322161" y="19291"/>
+                  <a:pt x="181336" y="38582"/>
+                  <a:pt x="104172" y="138896"/>
+                </a:cubicBezTo>
+                <a:cubicBezTo>
+                  <a:pt x="27008" y="239210"/>
+                  <a:pt x="23149" y="520861"/>
+                  <a:pt x="0" y="601884"/>
+                </a:cubicBezTo>
+              </a:path>
+            </a:pathLst>
+          </a:custGeom>
+          <a:ln w="12700"/>
+        </p:spPr>
+        <p:style>
+          <a:lnRef idx="1">
+            <a:schemeClr val="dk1"/>
+          </a:lnRef>
+          <a:fillRef idx="0">
+            <a:schemeClr val="dk1"/>
+          </a:fillRef>
+          <a:effectRef idx="0">
+            <a:schemeClr val="dk1"/>
+          </a:effectRef>
+          <a:fontRef idx="minor">
+            <a:schemeClr val="tx1"/>
+          </a:fontRef>
+        </p:style>
+        <p:txBody>
+          <a:bodyPr rtlCol="0" anchor="ctr"/>
+          <a:lstStyle/>
+          <a:p>
+            <a:pPr algn="ctr"/>
+            <a:endParaRPr kumimoji="1" lang="zh-CN" altLang="en-US"/>
+          </a:p>
+        </p:txBody>
+      </p:sp>
+      <mc:AlternateContent xmlns:mc="http://schemas.openxmlformats.org/markup-compatibility/2006" xmlns:a14="http://schemas.microsoft.com/office/drawing/2010/main">
+        <mc:Choice Requires="a14">
+          <p:sp>
+            <p:nvSpPr>
+              <p:cNvPr id="118" name="文本框 117">
+                <a:extLst>
+                  <a:ext uri="{FF2B5EF4-FFF2-40B4-BE49-F238E27FC236}">
+                    <a16:creationId xmlns:a16="http://schemas.microsoft.com/office/drawing/2014/main" id="{3EDB801F-7685-BD98-B88B-74D87C802BA5}"/>
+                  </a:ext>
+                </a:extLst>
+              </p:cNvPr>
+              <p:cNvSpPr txBox="1"/>
+              <p:nvPr/>
+            </p:nvSpPr>
+            <p:spPr>
+              <a:xfrm>
+                <a:off x="2997006" y="218203"/>
+                <a:ext cx="1987915" cy="369332"/>
+              </a:xfrm>
+              <a:prstGeom prst="rect">
+                <a:avLst/>
+              </a:prstGeom>
+              <a:noFill/>
+            </p:spPr>
+            <p:txBody>
+              <a:bodyPr wrap="none" rtlCol="0">
+                <a:spAutoFit/>
+              </a:bodyPr>
+              <a:lstStyle/>
+              <a:p>
+                <a:pPr/>
+                <a14:m>
+                  <m:oMathPara xmlns:m="http://schemas.openxmlformats.org/officeDocument/2006/math">
+                    <m:oMathParaPr>
+                      <m:jc m:val="centerGroup"/>
+                    </m:oMathParaPr>
+                    <m:oMath xmlns:m="http://schemas.openxmlformats.org/officeDocument/2006/math">
+                      <m:sSub>
+                        <m:sSubPr>
+                          <m:ctrlPr>
+                            <a:rPr kumimoji="1" lang="en-US" altLang="zh-CN" b="0" i="1" dirty="0" smtClean="0">
+                              <a:solidFill>
+                                <a:schemeClr val="accent1"/>
+                              </a:solidFill>
+                              <a:latin typeface="Cambria Math" panose="02040503050406030204" pitchFamily="18" charset="0"/>
+                            </a:rPr>
+                          </m:ctrlPr>
+                        </m:sSubPr>
+                        <m:e>
+                          <m:r>
+                            <a:rPr kumimoji="1" lang="en-US" altLang="zh-CN" i="1" dirty="0" smtClean="0">
+                              <a:solidFill>
+                                <a:schemeClr val="accent1"/>
+                              </a:solidFill>
+                              <a:latin typeface="Cambria Math" panose="02040503050406030204" pitchFamily="18" charset="0"/>
+                            </a:rPr>
+                            <m:t>𝑃</m:t>
+                          </m:r>
+                        </m:e>
+                        <m:sub>
+                          <m:r>
+                            <a:rPr kumimoji="1" lang="en-US" altLang="zh-CN" b="0" i="1" dirty="0" smtClean="0">
+                              <a:solidFill>
+                                <a:schemeClr val="accent1"/>
+                              </a:solidFill>
+                              <a:latin typeface="Cambria Math" panose="02040503050406030204" pitchFamily="18" charset="0"/>
+                            </a:rPr>
+                            <m:t>𝑐</m:t>
+                          </m:r>
+                        </m:sub>
+                      </m:sSub>
+                      <m:r>
+                        <a:rPr kumimoji="1" lang="en-US" altLang="zh-CN" i="1" dirty="0" smtClean="0">
+                          <a:solidFill>
+                            <a:schemeClr val="accent1"/>
+                          </a:solidFill>
+                          <a:latin typeface="Cambria Math" panose="02040503050406030204" pitchFamily="18" charset="0"/>
+                        </a:rPr>
+                        <m:t>=</m:t>
+                      </m:r>
+                      <m:r>
+                        <a:rPr kumimoji="1" lang="zh-CN" altLang="en-US" i="1" dirty="0" smtClean="0">
+                          <a:solidFill>
+                            <a:schemeClr val="accent1"/>
+                          </a:solidFill>
+                          <a:latin typeface="Cambria Math" panose="02040503050406030204" pitchFamily="18" charset="0"/>
+                        </a:rPr>
+                        <m:t> </m:t>
+                      </m:r>
+                      <m:r>
+                        <a:rPr kumimoji="1" lang="en-US" altLang="zh-CN" i="1" dirty="0" smtClean="0">
+                          <a:solidFill>
+                            <a:schemeClr val="accent1"/>
+                          </a:solidFill>
+                          <a:latin typeface="Cambria Math" panose="02040503050406030204" pitchFamily="18" charset="0"/>
+                        </a:rPr>
+                        <m:t>(</m:t>
+                      </m:r>
+                      <m:sSub>
+                        <m:sSubPr>
+                          <m:ctrlPr>
+                            <a:rPr kumimoji="1" lang="en-US" altLang="zh-CN" b="0" i="1" dirty="0" smtClean="0">
+                              <a:solidFill>
+                                <a:schemeClr val="accent1"/>
+                              </a:solidFill>
+                              <a:latin typeface="Cambria Math" panose="02040503050406030204" pitchFamily="18" charset="0"/>
+                            </a:rPr>
+                          </m:ctrlPr>
+                        </m:sSubPr>
+                        <m:e>
+                          <m:r>
+                            <a:rPr kumimoji="1" lang="en-US" altLang="zh-CN" i="1" dirty="0" smtClean="0">
+                              <a:solidFill>
+                                <a:schemeClr val="accent1"/>
+                              </a:solidFill>
+                              <a:latin typeface="Cambria Math" panose="02040503050406030204" pitchFamily="18" charset="0"/>
+                            </a:rPr>
+                            <m:t>𝑋</m:t>
+                          </m:r>
+                        </m:e>
+                        <m:sub>
+                          <m:r>
+                            <a:rPr kumimoji="1" lang="en-US" altLang="zh-CN" b="0" i="1" dirty="0" smtClean="0">
+                              <a:solidFill>
+                                <a:schemeClr val="accent1"/>
+                              </a:solidFill>
+                              <a:latin typeface="Cambria Math" panose="02040503050406030204" pitchFamily="18" charset="0"/>
+                            </a:rPr>
+                            <m:t>𝑤</m:t>
+                          </m:r>
+                        </m:sub>
+                      </m:sSub>
+                      <m:r>
+                        <a:rPr kumimoji="1" lang="en-US" altLang="zh-CN" b="0" i="1" dirty="0" smtClean="0">
+                          <a:solidFill>
+                            <a:schemeClr val="accent1"/>
+                          </a:solidFill>
+                          <a:latin typeface="Cambria Math" panose="02040503050406030204" pitchFamily="18" charset="0"/>
+                        </a:rPr>
+                        <m:t>,</m:t>
+                      </m:r>
+                      <m:r>
+                        <a:rPr kumimoji="1" lang="zh-CN" altLang="en-US" b="0" i="1" dirty="0" smtClean="0">
+                          <a:solidFill>
+                            <a:schemeClr val="accent1"/>
+                          </a:solidFill>
+                          <a:latin typeface="Cambria Math" panose="02040503050406030204" pitchFamily="18" charset="0"/>
+                        </a:rPr>
+                        <m:t> </m:t>
+                      </m:r>
+                      <m:sSub>
+                        <m:sSubPr>
+                          <m:ctrlPr>
+                            <a:rPr kumimoji="1" lang="en-US" altLang="zh-CN" b="0" i="1" dirty="0" smtClean="0">
+                              <a:solidFill>
+                                <a:schemeClr val="accent1"/>
+                              </a:solidFill>
+                              <a:latin typeface="Cambria Math" panose="02040503050406030204" pitchFamily="18" charset="0"/>
+                            </a:rPr>
+                          </m:ctrlPr>
+                        </m:sSubPr>
+                        <m:e>
+                          <m:r>
+                            <a:rPr kumimoji="1" lang="en-US" altLang="zh-CN" b="0" i="1" dirty="0" smtClean="0">
+                              <a:solidFill>
+                                <a:schemeClr val="accent1"/>
+                              </a:solidFill>
+                              <a:latin typeface="Cambria Math" panose="02040503050406030204" pitchFamily="18" charset="0"/>
+                            </a:rPr>
+                            <m:t>𝑌</m:t>
+                          </m:r>
+                        </m:e>
+                        <m:sub>
+                          <m:r>
+                            <a:rPr kumimoji="1" lang="en-US" altLang="zh-CN" b="0" i="1" dirty="0" smtClean="0">
+                              <a:solidFill>
+                                <a:schemeClr val="accent1"/>
+                              </a:solidFill>
+                              <a:latin typeface="Cambria Math" panose="02040503050406030204" pitchFamily="18" charset="0"/>
+                            </a:rPr>
+                            <m:t>𝑤</m:t>
+                          </m:r>
+                        </m:sub>
+                      </m:sSub>
+                      <m:r>
+                        <a:rPr kumimoji="1" lang="en-US" altLang="zh-CN" b="0" i="1" dirty="0" smtClean="0">
+                          <a:solidFill>
+                            <a:schemeClr val="accent1"/>
+                          </a:solidFill>
+                          <a:latin typeface="Cambria Math" panose="02040503050406030204" pitchFamily="18" charset="0"/>
+                        </a:rPr>
+                        <m:t>,</m:t>
+                      </m:r>
+                      <m:r>
+                        <a:rPr kumimoji="1" lang="zh-CN" altLang="en-US" b="0" i="1" dirty="0" smtClean="0">
+                          <a:solidFill>
+                            <a:schemeClr val="accent1"/>
+                          </a:solidFill>
+                          <a:latin typeface="Cambria Math" panose="02040503050406030204" pitchFamily="18" charset="0"/>
+                        </a:rPr>
+                        <m:t> </m:t>
+                      </m:r>
+                      <m:sSub>
+                        <m:sSubPr>
+                          <m:ctrlPr>
+                            <a:rPr kumimoji="1" lang="en-US" altLang="zh-CN" b="0" i="1" dirty="0" smtClean="0">
+                              <a:solidFill>
+                                <a:schemeClr val="accent1"/>
+                              </a:solidFill>
+                              <a:latin typeface="Cambria Math" panose="02040503050406030204" pitchFamily="18" charset="0"/>
+                            </a:rPr>
+                          </m:ctrlPr>
+                        </m:sSubPr>
+                        <m:e>
+                          <m:r>
+                            <a:rPr kumimoji="1" lang="en-US" altLang="zh-CN" b="0" i="1" dirty="0" smtClean="0">
+                              <a:solidFill>
+                                <a:schemeClr val="accent1"/>
+                              </a:solidFill>
+                              <a:latin typeface="Cambria Math" panose="02040503050406030204" pitchFamily="18" charset="0"/>
+                            </a:rPr>
+                            <m:t>𝑍</m:t>
+                          </m:r>
+                        </m:e>
+                        <m:sub>
+                          <m:r>
+                            <a:rPr kumimoji="1" lang="en-US" altLang="zh-CN" b="0" i="1" dirty="0" smtClean="0">
+                              <a:solidFill>
+                                <a:schemeClr val="accent1"/>
+                              </a:solidFill>
+                              <a:latin typeface="Cambria Math" panose="02040503050406030204" pitchFamily="18" charset="0"/>
+                            </a:rPr>
+                            <m:t>𝑤</m:t>
+                          </m:r>
+                        </m:sub>
+                      </m:sSub>
+                      <m:r>
+                        <a:rPr kumimoji="1" lang="en-US" altLang="zh-CN" i="1" dirty="0" smtClean="0">
+                          <a:solidFill>
+                            <a:schemeClr val="accent1"/>
+                          </a:solidFill>
+                          <a:latin typeface="Cambria Math" panose="02040503050406030204" pitchFamily="18" charset="0"/>
+                        </a:rPr>
+                        <m:t>)</m:t>
+                      </m:r>
+                    </m:oMath>
+                  </m:oMathPara>
+                </a14:m>
+                <a:endParaRPr kumimoji="1" lang="zh-CN" altLang="en-US" dirty="0">
+                  <a:solidFill>
+                    <a:schemeClr val="accent1"/>
+                  </a:solidFill>
+                </a:endParaRPr>
+              </a:p>
+            </p:txBody>
+          </p:sp>
+        </mc:Choice>
+        <mc:Fallback xmlns="">
+          <p:sp>
+            <p:nvSpPr>
+              <p:cNvPr id="118" name="文本框 117">
+                <a:extLst>
+                  <a:ext uri="{FF2B5EF4-FFF2-40B4-BE49-F238E27FC236}">
+                    <a16:creationId xmlns:a16="http://schemas.microsoft.com/office/drawing/2014/main" id="{3EDB801F-7685-BD98-B88B-74D87C802BA5}"/>
+                  </a:ext>
+                </a:extLst>
+              </p:cNvPr>
+              <p:cNvSpPr txBox="1">
+                <a:spLocks noRot="1" noChangeAspect="1" noMove="1" noResize="1" noEditPoints="1" noAdjustHandles="1" noChangeArrowheads="1" noChangeShapeType="1" noTextEdit="1"/>
+              </p:cNvSpPr>
+              <p:nvPr/>
+            </p:nvSpPr>
+            <p:spPr>
+              <a:xfrm>
+                <a:off x="2997006" y="218203"/>
+                <a:ext cx="1987915" cy="369332"/>
+              </a:xfrm>
+              <a:prstGeom prst="rect">
+                <a:avLst/>
+              </a:prstGeom>
+              <a:blipFill>
+                <a:blip r:embed="rId12"/>
+                <a:stretch>
+                  <a:fillRect b="-13333"/>
+                </a:stretch>
+              </a:blipFill>
+            </p:spPr>
+            <p:txBody>
+              <a:bodyPr/>
+              <a:lstStyle/>
+              <a:p>
+                <a:r>
+                  <a:rPr lang="zh-CN" altLang="en-US">
+                    <a:noFill/>
+                  </a:rPr>
+                  <a:t> </a:t>
+                </a:r>
+              </a:p>
+            </p:txBody>
+          </p:sp>
+        </mc:Fallback>
+      </mc:AlternateContent>
+      <mc:AlternateContent xmlns:mc="http://schemas.openxmlformats.org/markup-compatibility/2006" xmlns:a14="http://schemas.microsoft.com/office/drawing/2010/main">
+        <mc:Choice Requires="a14">
+          <p:sp>
+            <p:nvSpPr>
+              <p:cNvPr id="119" name="文本框 118">
+                <a:extLst>
+                  <a:ext uri="{FF2B5EF4-FFF2-40B4-BE49-F238E27FC236}">
+                    <a16:creationId xmlns:a16="http://schemas.microsoft.com/office/drawing/2014/main" id="{4418A3B5-5E83-1A7F-133F-55920345898E}"/>
+                  </a:ext>
+                </a:extLst>
+              </p:cNvPr>
+              <p:cNvSpPr txBox="1"/>
+              <p:nvPr/>
+            </p:nvSpPr>
+            <p:spPr>
+              <a:xfrm rot="18817345">
+                <a:off x="5185160" y="1809310"/>
+                <a:ext cx="994824" cy="307777"/>
+              </a:xfrm>
+              <a:prstGeom prst="rect">
+                <a:avLst/>
+              </a:prstGeom>
+              <a:noFill/>
+            </p:spPr>
+            <p:txBody>
+              <a:bodyPr wrap="none" rtlCol="0">
+                <a:spAutoFit/>
+              </a:bodyPr>
+              <a:lstStyle/>
+              <a:p>
+                <a:pPr/>
+                <a14:m>
+                  <m:oMathPara xmlns:m="http://schemas.openxmlformats.org/officeDocument/2006/math">
+                    <m:oMathParaPr>
+                      <m:jc m:val="centerGroup"/>
+                    </m:oMathParaPr>
+                    <m:oMath xmlns:m="http://schemas.openxmlformats.org/officeDocument/2006/math">
+                      <m:r>
+                        <a:rPr kumimoji="1" lang="en-US" altLang="zh-CN" sz="1400" b="0" i="1" smtClean="0">
+                          <a:solidFill>
+                            <a:schemeClr val="bg1">
+                              <a:lumMod val="50000"/>
+                            </a:schemeClr>
+                          </a:solidFill>
+                          <a:latin typeface="Cambria Math" panose="02040503050406030204" pitchFamily="18" charset="0"/>
+                        </a:rPr>
+                        <m:t>𝑝</m:t>
+                      </m:r>
+                      <m:r>
+                        <a:rPr kumimoji="1" lang="en-US" altLang="zh-CN" sz="1400" b="0" i="1" smtClean="0">
+                          <a:solidFill>
+                            <a:schemeClr val="bg1">
+                              <a:lumMod val="50000"/>
+                            </a:schemeClr>
+                          </a:solidFill>
+                          <a:latin typeface="Cambria Math" panose="02040503050406030204" pitchFamily="18" charset="0"/>
+                        </a:rPr>
+                        <m:t>=(</m:t>
+                      </m:r>
+                      <m:r>
+                        <a:rPr kumimoji="1" lang="en-US" altLang="zh-CN" sz="1400" b="0" i="1" smtClean="0">
+                          <a:solidFill>
+                            <a:schemeClr val="bg1">
+                              <a:lumMod val="50000"/>
+                            </a:schemeClr>
+                          </a:solidFill>
+                          <a:latin typeface="Cambria Math" panose="02040503050406030204" pitchFamily="18" charset="0"/>
+                        </a:rPr>
+                        <m:t>𝑢</m:t>
+                      </m:r>
+                      <m:r>
+                        <a:rPr kumimoji="1" lang="en-US" altLang="zh-CN" sz="1400" b="0" i="1" smtClean="0">
+                          <a:solidFill>
+                            <a:schemeClr val="bg1">
+                              <a:lumMod val="50000"/>
+                            </a:schemeClr>
+                          </a:solidFill>
+                          <a:latin typeface="Cambria Math" panose="02040503050406030204" pitchFamily="18" charset="0"/>
+                        </a:rPr>
+                        <m:t>, </m:t>
+                      </m:r>
+                      <m:r>
+                        <a:rPr kumimoji="1" lang="en-US" altLang="zh-CN" sz="1400" b="0" i="1" smtClean="0">
+                          <a:solidFill>
+                            <a:schemeClr val="bg1">
+                              <a:lumMod val="50000"/>
+                            </a:schemeClr>
+                          </a:solidFill>
+                          <a:latin typeface="Cambria Math" panose="02040503050406030204" pitchFamily="18" charset="0"/>
+                        </a:rPr>
+                        <m:t>𝑣</m:t>
+                      </m:r>
+                      <m:r>
+                        <a:rPr kumimoji="1" lang="en-US" altLang="zh-CN" sz="1400" b="0" i="1" smtClean="0">
+                          <a:solidFill>
+                            <a:schemeClr val="bg1">
+                              <a:lumMod val="50000"/>
+                            </a:schemeClr>
+                          </a:solidFill>
+                          <a:latin typeface="Cambria Math" panose="02040503050406030204" pitchFamily="18" charset="0"/>
+                        </a:rPr>
+                        <m:t>)</m:t>
+                      </m:r>
+                    </m:oMath>
+                  </m:oMathPara>
+                </a14:m>
+                <a:endParaRPr kumimoji="1" lang="zh-CN" altLang="en-US" sz="1400" dirty="0">
+                  <a:solidFill>
+                    <a:schemeClr val="bg1">
+                      <a:lumMod val="50000"/>
+                    </a:schemeClr>
+                  </a:solidFill>
+                </a:endParaRPr>
+              </a:p>
+            </p:txBody>
+          </p:sp>
+        </mc:Choice>
+        <mc:Fallback xmlns="">
+          <p:sp>
+            <p:nvSpPr>
+              <p:cNvPr id="119" name="文本框 118">
+                <a:extLst>
+                  <a:ext uri="{FF2B5EF4-FFF2-40B4-BE49-F238E27FC236}">
+                    <a16:creationId xmlns:a16="http://schemas.microsoft.com/office/drawing/2014/main" id="{4418A3B5-5E83-1A7F-133F-55920345898E}"/>
+                  </a:ext>
+                </a:extLst>
+              </p:cNvPr>
+              <p:cNvSpPr txBox="1">
+                <a:spLocks noRot="1" noChangeAspect="1" noMove="1" noResize="1" noEditPoints="1" noAdjustHandles="1" noChangeArrowheads="1" noChangeShapeType="1" noTextEdit="1"/>
+              </p:cNvSpPr>
+              <p:nvPr/>
+            </p:nvSpPr>
+            <p:spPr>
+              <a:xfrm rot="18817345">
+                <a:off x="5185160" y="1809310"/>
+                <a:ext cx="994824" cy="307777"/>
+              </a:xfrm>
+              <a:prstGeom prst="rect">
+                <a:avLst/>
+              </a:prstGeom>
+              <a:blipFill>
+                <a:blip r:embed="rId13"/>
+                <a:stretch>
+                  <a:fillRect/>
+                </a:stretch>
+              </a:blipFill>
+            </p:spPr>
+            <p:txBody>
+              <a:bodyPr/>
+              <a:lstStyle/>
+              <a:p>
+                <a:r>
+                  <a:rPr lang="zh-CN" altLang="en-US">
+                    <a:noFill/>
+                  </a:rPr>
+                  <a:t> </a:t>
+                </a:r>
+              </a:p>
+            </p:txBody>
+          </p:sp>
+        </mc:Fallback>
+      </mc:AlternateContent>
+      <mc:AlternateContent xmlns:mc="http://schemas.openxmlformats.org/markup-compatibility/2006" xmlns:a14="http://schemas.microsoft.com/office/drawing/2010/main">
+        <mc:Choice Requires="a14">
+          <p:sp>
+            <p:nvSpPr>
+              <p:cNvPr id="120" name="文本框 119">
+                <a:extLst>
+                  <a:ext uri="{FF2B5EF4-FFF2-40B4-BE49-F238E27FC236}">
+                    <a16:creationId xmlns:a16="http://schemas.microsoft.com/office/drawing/2014/main" id="{F1C5061F-F9A0-3591-424D-88E80D090CD4}"/>
+                  </a:ext>
+                </a:extLst>
+              </p:cNvPr>
+              <p:cNvSpPr txBox="1"/>
+              <p:nvPr/>
+            </p:nvSpPr>
+            <p:spPr>
+              <a:xfrm rot="20903127">
+                <a:off x="4880310" y="3374603"/>
+                <a:ext cx="1189493" cy="324769"/>
+              </a:xfrm>
+              <a:prstGeom prst="rect">
+                <a:avLst/>
+              </a:prstGeom>
+              <a:noFill/>
+            </p:spPr>
+            <p:txBody>
+              <a:bodyPr wrap="none" rtlCol="0">
+                <a:spAutoFit/>
+              </a:bodyPr>
+              <a:lstStyle/>
+              <a:p>
+                <a:pPr/>
+                <a14:m>
+                  <m:oMathPara xmlns:m="http://schemas.openxmlformats.org/officeDocument/2006/math">
+                    <m:oMathParaPr>
+                      <m:jc m:val="centerGroup"/>
+                    </m:oMathParaPr>
+                    <m:oMath xmlns:m="http://schemas.openxmlformats.org/officeDocument/2006/math">
+                      <m:sSubSup>
+                        <m:sSubSupPr>
+                          <m:ctrlPr>
+                            <a:rPr kumimoji="1" lang="en-US" altLang="zh-CN" sz="1400" b="0" i="1" smtClean="0">
+                              <a:solidFill>
+                                <a:schemeClr val="bg1">
+                                  <a:lumMod val="50000"/>
+                                </a:schemeClr>
+                              </a:solidFill>
+                              <a:latin typeface="Cambria Math" panose="02040503050406030204" pitchFamily="18" charset="0"/>
+                            </a:rPr>
+                          </m:ctrlPr>
+                        </m:sSubSupPr>
+                        <m:e>
+                          <m:r>
+                            <a:rPr kumimoji="1" lang="en-US" altLang="zh-CN" sz="1400" b="0" i="1" smtClean="0">
+                              <a:solidFill>
+                                <a:schemeClr val="bg1">
+                                  <a:lumMod val="50000"/>
+                                </a:schemeClr>
+                              </a:solidFill>
+                              <a:latin typeface="Cambria Math" panose="02040503050406030204" pitchFamily="18" charset="0"/>
+                            </a:rPr>
+                            <m:t>𝑜</m:t>
+                          </m:r>
+                        </m:e>
+                        <m:sub>
+                          <m:r>
+                            <a:rPr kumimoji="1" lang="en-US" altLang="zh-CN" sz="1400" b="0" i="1" smtClean="0">
+                              <a:solidFill>
+                                <a:schemeClr val="bg1">
+                                  <a:lumMod val="50000"/>
+                                </a:schemeClr>
+                              </a:solidFill>
+                              <a:latin typeface="Cambria Math" panose="02040503050406030204" pitchFamily="18" charset="0"/>
+                            </a:rPr>
+                            <m:t>𝑐</m:t>
+                          </m:r>
+                        </m:sub>
+                        <m:sup>
+                          <m:r>
+                            <a:rPr kumimoji="1" lang="en-US" altLang="zh-CN" sz="1400" b="0" i="1" smtClean="0">
+                              <a:solidFill>
+                                <a:schemeClr val="bg1">
+                                  <a:lumMod val="50000"/>
+                                </a:schemeClr>
+                              </a:solidFill>
+                              <a:latin typeface="Cambria Math" panose="02040503050406030204" pitchFamily="18" charset="0"/>
+                            </a:rPr>
+                            <m:t>′</m:t>
+                          </m:r>
+                        </m:sup>
+                      </m:sSubSup>
+                      <m:r>
+                        <a:rPr kumimoji="1" lang="en-US" altLang="zh-CN" sz="1400" b="0" i="1" smtClean="0">
+                          <a:solidFill>
+                            <a:schemeClr val="bg1">
+                              <a:lumMod val="50000"/>
+                            </a:schemeClr>
+                          </a:solidFill>
+                          <a:latin typeface="Cambria Math" panose="02040503050406030204" pitchFamily="18" charset="0"/>
+                        </a:rPr>
+                        <m:t>=(</m:t>
+                      </m:r>
+                      <m:sSub>
+                        <m:sSubPr>
+                          <m:ctrlPr>
+                            <a:rPr kumimoji="1" lang="en-US" altLang="zh-CN" sz="1400" b="0" i="1" smtClean="0">
+                              <a:solidFill>
+                                <a:schemeClr val="bg1">
+                                  <a:lumMod val="50000"/>
+                                </a:schemeClr>
+                              </a:solidFill>
+                              <a:latin typeface="Cambria Math" panose="02040503050406030204" pitchFamily="18" charset="0"/>
+                            </a:rPr>
+                          </m:ctrlPr>
+                        </m:sSubPr>
+                        <m:e>
+                          <m:r>
+                            <a:rPr kumimoji="1" lang="en-US" altLang="zh-CN" sz="1400" b="0" i="1" smtClean="0">
+                              <a:solidFill>
+                                <a:schemeClr val="bg1">
+                                  <a:lumMod val="50000"/>
+                                </a:schemeClr>
+                              </a:solidFill>
+                              <a:latin typeface="Cambria Math" panose="02040503050406030204" pitchFamily="18" charset="0"/>
+                            </a:rPr>
+                            <m:t>𝑐</m:t>
+                          </m:r>
+                        </m:e>
+                        <m:sub>
+                          <m:r>
+                            <a:rPr kumimoji="1" lang="en-US" altLang="zh-CN" sz="1400" b="0" i="1" smtClean="0">
+                              <a:solidFill>
+                                <a:schemeClr val="bg1">
+                                  <a:lumMod val="50000"/>
+                                </a:schemeClr>
+                              </a:solidFill>
+                              <a:latin typeface="Cambria Math" panose="02040503050406030204" pitchFamily="18" charset="0"/>
+                            </a:rPr>
+                            <m:t>𝑥</m:t>
+                          </m:r>
+                        </m:sub>
+                      </m:sSub>
+                      <m:r>
+                        <a:rPr kumimoji="1" lang="en-US" altLang="zh-CN" sz="1400" b="0" i="1" smtClean="0">
+                          <a:solidFill>
+                            <a:schemeClr val="bg1">
+                              <a:lumMod val="50000"/>
+                            </a:schemeClr>
+                          </a:solidFill>
+                          <a:latin typeface="Cambria Math" panose="02040503050406030204" pitchFamily="18" charset="0"/>
+                        </a:rPr>
+                        <m:t>, </m:t>
+                      </m:r>
+                      <m:sSub>
+                        <m:sSubPr>
+                          <m:ctrlPr>
+                            <a:rPr kumimoji="1" lang="en-US" altLang="zh-CN" sz="1400" b="0" i="1" smtClean="0">
+                              <a:solidFill>
+                                <a:schemeClr val="bg1">
+                                  <a:lumMod val="50000"/>
+                                </a:schemeClr>
+                              </a:solidFill>
+                              <a:latin typeface="Cambria Math" panose="02040503050406030204" pitchFamily="18" charset="0"/>
+                            </a:rPr>
+                          </m:ctrlPr>
+                        </m:sSubPr>
+                        <m:e>
+                          <m:r>
+                            <a:rPr kumimoji="1" lang="en-US" altLang="zh-CN" sz="1400" b="0" i="1" smtClean="0">
+                              <a:solidFill>
+                                <a:schemeClr val="bg1">
+                                  <a:lumMod val="50000"/>
+                                </a:schemeClr>
+                              </a:solidFill>
+                              <a:latin typeface="Cambria Math" panose="02040503050406030204" pitchFamily="18" charset="0"/>
+                            </a:rPr>
+                            <m:t>𝑐</m:t>
+                          </m:r>
+                        </m:e>
+                        <m:sub>
+                          <m:r>
+                            <a:rPr kumimoji="1" lang="en-US" altLang="zh-CN" sz="1400" b="0" i="1" smtClean="0">
+                              <a:solidFill>
+                                <a:schemeClr val="bg1">
+                                  <a:lumMod val="50000"/>
+                                </a:schemeClr>
+                              </a:solidFill>
+                              <a:latin typeface="Cambria Math" panose="02040503050406030204" pitchFamily="18" charset="0"/>
+                            </a:rPr>
+                            <m:t>𝑦</m:t>
+                          </m:r>
+                        </m:sub>
+                      </m:sSub>
+                      <m:r>
+                        <a:rPr kumimoji="1" lang="en-US" altLang="zh-CN" sz="1400" b="0" i="1" smtClean="0">
+                          <a:solidFill>
+                            <a:schemeClr val="bg1">
+                              <a:lumMod val="50000"/>
+                            </a:schemeClr>
+                          </a:solidFill>
+                          <a:latin typeface="Cambria Math" panose="02040503050406030204" pitchFamily="18" charset="0"/>
+                        </a:rPr>
+                        <m:t>)</m:t>
+                      </m:r>
+                    </m:oMath>
+                  </m:oMathPara>
+                </a14:m>
+                <a:endParaRPr kumimoji="1" lang="zh-CN" altLang="en-US" sz="1400" dirty="0">
+                  <a:solidFill>
+                    <a:schemeClr val="bg1">
+                      <a:lumMod val="50000"/>
+                    </a:schemeClr>
+                  </a:solidFill>
+                </a:endParaRPr>
+              </a:p>
+            </p:txBody>
+          </p:sp>
+        </mc:Choice>
+        <mc:Fallback xmlns="">
+          <p:sp>
+            <p:nvSpPr>
+              <p:cNvPr id="120" name="文本框 119">
+                <a:extLst>
+                  <a:ext uri="{FF2B5EF4-FFF2-40B4-BE49-F238E27FC236}">
+                    <a16:creationId xmlns:a16="http://schemas.microsoft.com/office/drawing/2014/main" id="{F1C5061F-F9A0-3591-424D-88E80D090CD4}"/>
+                  </a:ext>
+                </a:extLst>
+              </p:cNvPr>
+              <p:cNvSpPr txBox="1">
+                <a:spLocks noRot="1" noChangeAspect="1" noMove="1" noResize="1" noEditPoints="1" noAdjustHandles="1" noChangeArrowheads="1" noChangeShapeType="1" noTextEdit="1"/>
+              </p:cNvSpPr>
+              <p:nvPr/>
+            </p:nvSpPr>
+            <p:spPr>
+              <a:xfrm rot="20903127">
+                <a:off x="4880310" y="3374603"/>
+                <a:ext cx="1189493" cy="324769"/>
+              </a:xfrm>
+              <a:prstGeom prst="rect">
+                <a:avLst/>
+              </a:prstGeom>
+              <a:blipFill>
+                <a:blip r:embed="rId14"/>
+                <a:stretch>
+                  <a:fillRect/>
+                </a:stretch>
+              </a:blipFill>
+            </p:spPr>
+            <p:txBody>
+              <a:bodyPr/>
+              <a:lstStyle/>
+              <a:p>
+                <a:r>
+                  <a:rPr lang="zh-CN" altLang="en-US">
+                    <a:noFill/>
+                  </a:rPr>
+                  <a:t> </a:t>
+                </a:r>
+              </a:p>
+            </p:txBody>
+          </p:sp>
+        </mc:Fallback>
+      </mc:AlternateContent>
+      <p:sp>
+        <p:nvSpPr>
+          <p:cNvPr id="121" name="任意形状 120">
+            <a:extLst>
+              <a:ext uri="{FF2B5EF4-FFF2-40B4-BE49-F238E27FC236}">
+                <a16:creationId xmlns:a16="http://schemas.microsoft.com/office/drawing/2014/main" id="{75A48C69-F509-8F33-0B0A-DB4BA51E7AB3}"/>
+              </a:ext>
+            </a:extLst>
+          </p:cNvPr>
+          <p:cNvSpPr/>
+          <p:nvPr/>
+        </p:nvSpPr>
+        <p:spPr>
+          <a:xfrm rot="5781107">
+            <a:off x="4858720" y="3125976"/>
+            <a:ext cx="207387" cy="461185"/>
+          </a:xfrm>
+          <a:custGeom>
+            <a:avLst/>
+            <a:gdLst>
+              <a:gd name="connsiteX0" fmla="*/ 250838 w 250838"/>
+              <a:gd name="connsiteY0" fmla="*/ 0 h 348712"/>
+              <a:gd name="connsiteX1" fmla="*/ 10614 w 250838"/>
+              <a:gd name="connsiteY1" fmla="*/ 170482 h 348712"/>
+              <a:gd name="connsiteX2" fmla="*/ 64858 w 250838"/>
+              <a:gd name="connsiteY2" fmla="*/ 348712 h 348712"/>
+            </a:gdLst>
+            <a:ahLst/>
+            <a:cxnLst>
+              <a:cxn ang="0">
+                <a:pos x="connsiteX0" y="connsiteY0"/>
+              </a:cxn>
+              <a:cxn ang="0">
+                <a:pos x="connsiteX1" y="connsiteY1"/>
+              </a:cxn>
+              <a:cxn ang="0">
+                <a:pos x="connsiteX2" y="connsiteY2"/>
+              </a:cxn>
+            </a:cxnLst>
+            <a:rect l="l" t="t" r="r" b="b"/>
+            <a:pathLst>
+              <a:path w="250838" h="348712">
+                <a:moveTo>
+                  <a:pt x="250838" y="0"/>
+                </a:moveTo>
+                <a:cubicBezTo>
+                  <a:pt x="146224" y="56181"/>
+                  <a:pt x="41611" y="112363"/>
+                  <a:pt x="10614" y="170482"/>
+                </a:cubicBezTo>
+                <a:cubicBezTo>
+                  <a:pt x="-20383" y="228601"/>
+                  <a:pt x="22237" y="288656"/>
+                  <a:pt x="64858" y="348712"/>
+                </a:cubicBezTo>
+              </a:path>
+            </a:pathLst>
+          </a:custGeom>
+          <a:noFill/>
+          <a:ln>
+            <a:solidFill>
+              <a:schemeClr val="bg1">
+                <a:lumMod val="50000"/>
+              </a:schemeClr>
+            </a:solidFill>
+          </a:ln>
+        </p:spPr>
+        <p:style>
+          <a:lnRef idx="2">
+            <a:schemeClr val="accent1">
+              <a:shade val="50000"/>
+            </a:schemeClr>
+          </a:lnRef>
+          <a:fillRef idx="1">
+            <a:schemeClr val="accent1"/>
+          </a:fillRef>
+          <a:effectRef idx="0">
+            <a:schemeClr val="accent1"/>
+          </a:effectRef>
+          <a:fontRef idx="minor">
+            <a:schemeClr val="lt1"/>
+          </a:fontRef>
+        </p:style>
+        <p:txBody>
+          <a:bodyPr rtlCol="0" anchor="ctr"/>
+          <a:lstStyle/>
+          <a:p>
+            <a:pPr algn="ctr"/>
+            <a:endParaRPr kumimoji="1" lang="zh-CN" altLang="en-US"/>
+          </a:p>
+        </p:txBody>
+      </p:sp>
+      <p:sp>
+        <p:nvSpPr>
+          <p:cNvPr id="123" name="文本框 122">
+            <a:extLst>
+              <a:ext uri="{FF2B5EF4-FFF2-40B4-BE49-F238E27FC236}">
+                <a16:creationId xmlns:a16="http://schemas.microsoft.com/office/drawing/2014/main" id="{DDACEF02-8F74-CCB0-8EA5-AB363290065B}"/>
+              </a:ext>
+            </a:extLst>
+          </p:cNvPr>
+          <p:cNvSpPr txBox="1"/>
+          <p:nvPr/>
+        </p:nvSpPr>
+        <p:spPr>
+          <a:xfrm>
+            <a:off x="3707877" y="6113477"/>
+            <a:ext cx="2303836" cy="369332"/>
+          </a:xfrm>
+          <a:prstGeom prst="rect">
+            <a:avLst/>
+          </a:prstGeom>
+          <a:noFill/>
+        </p:spPr>
+        <p:txBody>
+          <a:bodyPr wrap="none" rtlCol="0">
+            <a:spAutoFit/>
+          </a:bodyPr>
+          <a:lstStyle/>
+          <a:p>
+            <a:r>
+              <a:rPr kumimoji="1" lang="zh-CN" altLang="en-US" dirty="0"/>
+              <a:t>针孔相机模型示意图</a:t>
+            </a:r>
+          </a:p>
+        </p:txBody>
+      </p:sp>
     </p:spTree>
     <p:extLst>
       <p:ext uri="{BB962C8B-B14F-4D97-AF65-F5344CB8AC3E}">

</xml_diff>